<commit_message>
added observer with threads and resetevents
</commit_message>
<xml_diff>
--- a/07 Thread Synchronization 2/Thread Synchronization pt 2.pptx
+++ b/07 Thread Synchronization 2/Thread Synchronization pt 2.pptx
@@ -5,7 +5,7 @@
     <p:sldMasterId id="2147483648" r:id="rId1"/>
   </p:sldMasterIdLst>
   <p:notesMasterIdLst>
-    <p:notesMasterId r:id="rId38"/>
+    <p:notesMasterId r:id="rId43"/>
   </p:notesMasterIdLst>
   <p:sldIdLst>
     <p:sldId id="256" r:id="rId2"/>
@@ -41,9 +41,14 @@
     <p:sldId id="367" r:id="rId32"/>
     <p:sldId id="368" r:id="rId33"/>
     <p:sldId id="369" r:id="rId34"/>
-    <p:sldId id="371" r:id="rId35"/>
-    <p:sldId id="259" r:id="rId36"/>
-    <p:sldId id="257" r:id="rId37"/>
+    <p:sldId id="372" r:id="rId35"/>
+    <p:sldId id="373" r:id="rId36"/>
+    <p:sldId id="374" r:id="rId37"/>
+    <p:sldId id="375" r:id="rId38"/>
+    <p:sldId id="376" r:id="rId39"/>
+    <p:sldId id="371" r:id="rId40"/>
+    <p:sldId id="259" r:id="rId41"/>
+    <p:sldId id="257" r:id="rId42"/>
   </p:sldIdLst>
   <p:sldSz cx="12192000" cy="6858000"/>
   <p:notesSz cx="6858000" cy="9144000"/>
@@ -232,7 +237,7 @@
           <a:p>
             <a:fld id="{C3D45B35-5990-4A22-9246-3EAB55A12994}" type="datetimeFigureOut">
               <a:rPr lang="da-DK" smtClean="0"/>
-              <a:t>04.10.2023</a:t>
+              <a:t>04-10-2023</a:t>
             </a:fld>
             <a:endParaRPr lang="da-DK"/>
           </a:p>
@@ -2195,6 +2200,10 @@
           <a:bodyPr/>
           <a:lstStyle/>
           <a:p>
+            <a:r>
+              <a:rPr lang="en-US" dirty="0"/>
+              <a:t>Let’s look at the part with the Events.</a:t>
+            </a:r>
             <a:endParaRPr lang="da-DK" dirty="0"/>
           </a:p>
         </p:txBody>
@@ -2216,7 +2225,347 @@
           <a:p>
             <a:fld id="{E41AB761-37ED-4EFA-99FC-D346B55B115C}" type="slidenum">
               <a:rPr lang="da-DK" smtClean="0"/>
-              <a:t>34</a:t>
+              <a:t>35</a:t>
+            </a:fld>
+            <a:endParaRPr lang="da-DK"/>
+          </a:p>
+        </p:txBody>
+      </p:sp>
+    </p:spTree>
+    <p:extLst>
+      <p:ext uri="{BB962C8B-B14F-4D97-AF65-F5344CB8AC3E}">
+        <p14:creationId xmlns:p14="http://schemas.microsoft.com/office/powerpoint/2010/main" val="2735257723"/>
+      </p:ext>
+    </p:extLst>
+  </p:cSld>
+  <p:clrMapOvr>
+    <a:masterClrMapping/>
+  </p:clrMapOvr>
+</p:notes>
+</file>
+
+<file path=ppt/notesSlides/notesSlide25.xml><?xml version="1.0" encoding="utf-8"?>
+<p:notes xmlns:a="http://schemas.openxmlformats.org/drawingml/2006/main" xmlns:r="http://schemas.openxmlformats.org/officeDocument/2006/relationships" xmlns:p="http://schemas.openxmlformats.org/presentationml/2006/main">
+  <p:cSld>
+    <p:spTree>
+      <p:nvGrpSpPr>
+        <p:cNvPr id="1" name=""/>
+        <p:cNvGrpSpPr/>
+        <p:nvPr/>
+      </p:nvGrpSpPr>
+      <p:grpSpPr>
+        <a:xfrm>
+          <a:off x="0" y="0"/>
+          <a:ext cx="0" cy="0"/>
+          <a:chOff x="0" y="0"/>
+          <a:chExt cx="0" cy="0"/>
+        </a:xfrm>
+      </p:grpSpPr>
+      <p:sp>
+        <p:nvSpPr>
+          <p:cNvPr id="2" name="Slide Image Placeholder 1"/>
+          <p:cNvSpPr>
+            <a:spLocks noGrp="1" noRot="1" noChangeAspect="1"/>
+          </p:cNvSpPr>
+          <p:nvPr>
+            <p:ph type="sldImg"/>
+          </p:nvPr>
+        </p:nvSpPr>
+        <p:spPr/>
+      </p:sp>
+      <p:sp>
+        <p:nvSpPr>
+          <p:cNvPr id="3" name="Notes Placeholder 2"/>
+          <p:cNvSpPr>
+            <a:spLocks noGrp="1"/>
+          </p:cNvSpPr>
+          <p:nvPr>
+            <p:ph type="body" idx="1"/>
+          </p:nvPr>
+        </p:nvSpPr>
+        <p:spPr/>
+        <p:txBody>
+          <a:bodyPr/>
+          <a:lstStyle/>
+          <a:p>
+            <a:r>
+              <a:rPr lang="en-US" dirty="0"/>
+              <a:t>Let’s look at the part with the Events.</a:t>
+            </a:r>
+            <a:endParaRPr lang="da-DK" dirty="0"/>
+          </a:p>
+        </p:txBody>
+      </p:sp>
+      <p:sp>
+        <p:nvSpPr>
+          <p:cNvPr id="4" name="Slide Number Placeholder 3"/>
+          <p:cNvSpPr>
+            <a:spLocks noGrp="1"/>
+          </p:cNvSpPr>
+          <p:nvPr>
+            <p:ph type="sldNum" sz="quarter" idx="10"/>
+          </p:nvPr>
+        </p:nvSpPr>
+        <p:spPr/>
+        <p:txBody>
+          <a:bodyPr/>
+          <a:lstStyle/>
+          <a:p>
+            <a:fld id="{E41AB761-37ED-4EFA-99FC-D346B55B115C}" type="slidenum">
+              <a:rPr lang="da-DK" smtClean="0"/>
+              <a:t>36</a:t>
+            </a:fld>
+            <a:endParaRPr lang="da-DK"/>
+          </a:p>
+        </p:txBody>
+      </p:sp>
+    </p:spTree>
+    <p:extLst>
+      <p:ext uri="{BB962C8B-B14F-4D97-AF65-F5344CB8AC3E}">
+        <p14:creationId xmlns:p14="http://schemas.microsoft.com/office/powerpoint/2010/main" val="1055777336"/>
+      </p:ext>
+    </p:extLst>
+  </p:cSld>
+  <p:clrMapOvr>
+    <a:masterClrMapping/>
+  </p:clrMapOvr>
+</p:notes>
+</file>
+
+<file path=ppt/notesSlides/notesSlide26.xml><?xml version="1.0" encoding="utf-8"?>
+<p:notes xmlns:a="http://schemas.openxmlformats.org/drawingml/2006/main" xmlns:r="http://schemas.openxmlformats.org/officeDocument/2006/relationships" xmlns:p="http://schemas.openxmlformats.org/presentationml/2006/main">
+  <p:cSld>
+    <p:spTree>
+      <p:nvGrpSpPr>
+        <p:cNvPr id="1" name=""/>
+        <p:cNvGrpSpPr/>
+        <p:nvPr/>
+      </p:nvGrpSpPr>
+      <p:grpSpPr>
+        <a:xfrm>
+          <a:off x="0" y="0"/>
+          <a:ext cx="0" cy="0"/>
+          <a:chOff x="0" y="0"/>
+          <a:chExt cx="0" cy="0"/>
+        </a:xfrm>
+      </p:grpSpPr>
+      <p:sp>
+        <p:nvSpPr>
+          <p:cNvPr id="2" name="Slide Image Placeholder 1"/>
+          <p:cNvSpPr>
+            <a:spLocks noGrp="1" noRot="1" noChangeAspect="1"/>
+          </p:cNvSpPr>
+          <p:nvPr>
+            <p:ph type="sldImg"/>
+          </p:nvPr>
+        </p:nvSpPr>
+        <p:spPr/>
+      </p:sp>
+      <p:sp>
+        <p:nvSpPr>
+          <p:cNvPr id="3" name="Notes Placeholder 2"/>
+          <p:cNvSpPr>
+            <a:spLocks noGrp="1"/>
+          </p:cNvSpPr>
+          <p:nvPr>
+            <p:ph type="body" idx="1"/>
+          </p:nvPr>
+        </p:nvSpPr>
+        <p:spPr/>
+        <p:txBody>
+          <a:bodyPr/>
+          <a:lstStyle/>
+          <a:p>
+            <a:endParaRPr lang="da-DK" dirty="0"/>
+          </a:p>
+        </p:txBody>
+      </p:sp>
+      <p:sp>
+        <p:nvSpPr>
+          <p:cNvPr id="4" name="Slide Number Placeholder 3"/>
+          <p:cNvSpPr>
+            <a:spLocks noGrp="1"/>
+          </p:cNvSpPr>
+          <p:nvPr>
+            <p:ph type="sldNum" sz="quarter" idx="10"/>
+          </p:nvPr>
+        </p:nvSpPr>
+        <p:spPr/>
+        <p:txBody>
+          <a:bodyPr/>
+          <a:lstStyle/>
+          <a:p>
+            <a:fld id="{E41AB761-37ED-4EFA-99FC-D346B55B115C}" type="slidenum">
+              <a:rPr lang="da-DK" smtClean="0"/>
+              <a:t>37</a:t>
+            </a:fld>
+            <a:endParaRPr lang="da-DK"/>
+          </a:p>
+        </p:txBody>
+      </p:sp>
+    </p:spTree>
+    <p:extLst>
+      <p:ext uri="{BB962C8B-B14F-4D97-AF65-F5344CB8AC3E}">
+        <p14:creationId xmlns:p14="http://schemas.microsoft.com/office/powerpoint/2010/main" val="3614846624"/>
+      </p:ext>
+    </p:extLst>
+  </p:cSld>
+  <p:clrMapOvr>
+    <a:masterClrMapping/>
+  </p:clrMapOvr>
+</p:notes>
+</file>
+
+<file path=ppt/notesSlides/notesSlide27.xml><?xml version="1.0" encoding="utf-8"?>
+<p:notes xmlns:a="http://schemas.openxmlformats.org/drawingml/2006/main" xmlns:r="http://schemas.openxmlformats.org/officeDocument/2006/relationships" xmlns:p="http://schemas.openxmlformats.org/presentationml/2006/main">
+  <p:cSld>
+    <p:spTree>
+      <p:nvGrpSpPr>
+        <p:cNvPr id="1" name=""/>
+        <p:cNvGrpSpPr/>
+        <p:nvPr/>
+      </p:nvGrpSpPr>
+      <p:grpSpPr>
+        <a:xfrm>
+          <a:off x="0" y="0"/>
+          <a:ext cx="0" cy="0"/>
+          <a:chOff x="0" y="0"/>
+          <a:chExt cx="0" cy="0"/>
+        </a:xfrm>
+      </p:grpSpPr>
+      <p:sp>
+        <p:nvSpPr>
+          <p:cNvPr id="2" name="Slide Image Placeholder 1"/>
+          <p:cNvSpPr>
+            <a:spLocks noGrp="1" noRot="1" noChangeAspect="1"/>
+          </p:cNvSpPr>
+          <p:nvPr>
+            <p:ph type="sldImg"/>
+          </p:nvPr>
+        </p:nvSpPr>
+        <p:spPr/>
+      </p:sp>
+      <p:sp>
+        <p:nvSpPr>
+          <p:cNvPr id="3" name="Notes Placeholder 2"/>
+          <p:cNvSpPr>
+            <a:spLocks noGrp="1"/>
+          </p:cNvSpPr>
+          <p:nvPr>
+            <p:ph type="body" idx="1"/>
+          </p:nvPr>
+        </p:nvSpPr>
+        <p:spPr/>
+        <p:txBody>
+          <a:bodyPr/>
+          <a:lstStyle/>
+          <a:p>
+            <a:endParaRPr lang="da-DK" dirty="0"/>
+          </a:p>
+        </p:txBody>
+      </p:sp>
+      <p:sp>
+        <p:nvSpPr>
+          <p:cNvPr id="4" name="Slide Number Placeholder 3"/>
+          <p:cNvSpPr>
+            <a:spLocks noGrp="1"/>
+          </p:cNvSpPr>
+          <p:nvPr>
+            <p:ph type="sldNum" sz="quarter" idx="10"/>
+          </p:nvPr>
+        </p:nvSpPr>
+        <p:spPr/>
+        <p:txBody>
+          <a:bodyPr/>
+          <a:lstStyle/>
+          <a:p>
+            <a:fld id="{E41AB761-37ED-4EFA-99FC-D346B55B115C}" type="slidenum">
+              <a:rPr lang="da-DK" smtClean="0"/>
+              <a:t>38</a:t>
+            </a:fld>
+            <a:endParaRPr lang="da-DK"/>
+          </a:p>
+        </p:txBody>
+      </p:sp>
+    </p:spTree>
+    <p:extLst>
+      <p:ext uri="{BB962C8B-B14F-4D97-AF65-F5344CB8AC3E}">
+        <p14:creationId xmlns:p14="http://schemas.microsoft.com/office/powerpoint/2010/main" val="441969886"/>
+      </p:ext>
+    </p:extLst>
+  </p:cSld>
+  <p:clrMapOvr>
+    <a:masterClrMapping/>
+  </p:clrMapOvr>
+</p:notes>
+</file>
+
+<file path=ppt/notesSlides/notesSlide28.xml><?xml version="1.0" encoding="utf-8"?>
+<p:notes xmlns:a="http://schemas.openxmlformats.org/drawingml/2006/main" xmlns:r="http://schemas.openxmlformats.org/officeDocument/2006/relationships" xmlns:p="http://schemas.openxmlformats.org/presentationml/2006/main">
+  <p:cSld>
+    <p:spTree>
+      <p:nvGrpSpPr>
+        <p:cNvPr id="1" name=""/>
+        <p:cNvGrpSpPr/>
+        <p:nvPr/>
+      </p:nvGrpSpPr>
+      <p:grpSpPr>
+        <a:xfrm>
+          <a:off x="0" y="0"/>
+          <a:ext cx="0" cy="0"/>
+          <a:chOff x="0" y="0"/>
+          <a:chExt cx="0" cy="0"/>
+        </a:xfrm>
+      </p:grpSpPr>
+      <p:sp>
+        <p:nvSpPr>
+          <p:cNvPr id="2" name="Slide Image Placeholder 1"/>
+          <p:cNvSpPr>
+            <a:spLocks noGrp="1" noRot="1" noChangeAspect="1"/>
+          </p:cNvSpPr>
+          <p:nvPr>
+            <p:ph type="sldImg"/>
+          </p:nvPr>
+        </p:nvSpPr>
+        <p:spPr/>
+      </p:sp>
+      <p:sp>
+        <p:nvSpPr>
+          <p:cNvPr id="3" name="Notes Placeholder 2"/>
+          <p:cNvSpPr>
+            <a:spLocks noGrp="1"/>
+          </p:cNvSpPr>
+          <p:nvPr>
+            <p:ph type="body" idx="1"/>
+          </p:nvPr>
+        </p:nvSpPr>
+        <p:spPr/>
+        <p:txBody>
+          <a:bodyPr/>
+          <a:lstStyle/>
+          <a:p>
+            <a:endParaRPr lang="da-DK" dirty="0"/>
+          </a:p>
+        </p:txBody>
+      </p:sp>
+      <p:sp>
+        <p:nvSpPr>
+          <p:cNvPr id="4" name="Slide Number Placeholder 3"/>
+          <p:cNvSpPr>
+            <a:spLocks noGrp="1"/>
+          </p:cNvSpPr>
+          <p:nvPr>
+            <p:ph type="sldNum" sz="quarter" idx="10"/>
+          </p:nvPr>
+        </p:nvSpPr>
+        <p:spPr/>
+        <p:txBody>
+          <a:bodyPr/>
+          <a:lstStyle/>
+          <a:p>
+            <a:fld id="{E41AB761-37ED-4EFA-99FC-D346B55B115C}" type="slidenum">
+              <a:rPr lang="da-DK" smtClean="0"/>
+              <a:t>39</a:t>
             </a:fld>
             <a:endParaRPr lang="da-DK"/>
           </a:p>
@@ -6152,6 +6501,13 @@
   <p:clrMapOvr>
     <a:masterClrMapping/>
   </p:clrMapOvr>
+  <p:timing>
+    <p:tnLst>
+      <p:par>
+        <p:cTn id="1" dur="indefinite" restart="never" nodeType="tmRoot"/>
+      </p:par>
+    </p:tnLst>
+  </p:timing>
 </p:sld>
 </file>
 
@@ -6383,6 +6739,13 @@
   <p:clrMapOvr>
     <a:masterClrMapping/>
   </p:clrMapOvr>
+  <p:timing>
+    <p:tnLst>
+      <p:par>
+        <p:cTn id="1" dur="indefinite" restart="never" nodeType="tmRoot"/>
+      </p:par>
+    </p:tnLst>
+  </p:timing>
 </p:sld>
 </file>
 
@@ -6596,6 +6959,13 @@
   <p:clrMapOvr>
     <a:masterClrMapping/>
   </p:clrMapOvr>
+  <p:timing>
+    <p:tnLst>
+      <p:par>
+        <p:cTn id="1" dur="indefinite" restart="never" nodeType="tmRoot"/>
+      </p:par>
+    </p:tnLst>
+  </p:timing>
 </p:sld>
 </file>
 
@@ -7059,6 +7429,13 @@
   <p:clrMapOvr>
     <a:masterClrMapping/>
   </p:clrMapOvr>
+  <p:timing>
+    <p:tnLst>
+      <p:par>
+        <p:cTn id="1" dur="indefinite" restart="never" nodeType="tmRoot"/>
+      </p:par>
+    </p:tnLst>
+  </p:timing>
 </p:sld>
 </file>
 
@@ -7268,6 +7645,13 @@
   <p:clrMapOvr>
     <a:masterClrMapping/>
   </p:clrMapOvr>
+  <p:timing>
+    <p:tnLst>
+      <p:par>
+        <p:cTn id="1" dur="indefinite" restart="never" nodeType="tmRoot"/>
+      </p:par>
+    </p:tnLst>
+  </p:timing>
 </p:sld>
 </file>
 
@@ -7344,6 +7728,13 @@
   <p:clrMapOvr>
     <a:masterClrMapping/>
   </p:clrMapOvr>
+  <p:timing>
+    <p:tnLst>
+      <p:par>
+        <p:cTn id="1" dur="indefinite" restart="never" nodeType="tmRoot"/>
+      </p:par>
+    </p:tnLst>
+  </p:timing>
 </p:sld>
 </file>
 
@@ -7634,6 +8025,13 @@
   <p:clrMapOvr>
     <a:masterClrMapping/>
   </p:clrMapOvr>
+  <p:timing>
+    <p:tnLst>
+      <p:par>
+        <p:cTn id="1" dur="indefinite" restart="never" nodeType="tmRoot"/>
+      </p:par>
+    </p:tnLst>
+  </p:timing>
 </p:sld>
 </file>
 
@@ -7916,6 +8314,13 @@
   <p:clrMapOvr>
     <a:masterClrMapping/>
   </p:clrMapOvr>
+  <p:timing>
+    <p:tnLst>
+      <p:par>
+        <p:cTn id="1" dur="indefinite" restart="never" nodeType="tmRoot"/>
+      </p:par>
+    </p:tnLst>
+  </p:timing>
 </p:sld>
 </file>
 
@@ -8046,6 +8451,13 @@
   <p:clrMapOvr>
     <a:masterClrMapping/>
   </p:clrMapOvr>
+  <p:timing>
+    <p:tnLst>
+      <p:par>
+        <p:cTn id="1" dur="indefinite" restart="never" nodeType="tmRoot"/>
+      </p:par>
+    </p:tnLst>
+  </p:timing>
 </p:sld>
 </file>
 
@@ -8239,6 +8651,13 @@
   <p:clrMapOvr>
     <a:masterClrMapping/>
   </p:clrMapOvr>
+  <p:timing>
+    <p:tnLst>
+      <p:par>
+        <p:cTn id="1" dur="indefinite" restart="never" nodeType="tmRoot"/>
+      </p:par>
+    </p:tnLst>
+  </p:timing>
 </p:sld>
 </file>
 
@@ -8315,6 +8734,13 @@
   <p:clrMapOvr>
     <a:masterClrMapping/>
   </p:clrMapOvr>
+  <p:timing>
+    <p:tnLst>
+      <p:par>
+        <p:cTn id="1" dur="indefinite" restart="never" nodeType="tmRoot"/>
+      </p:par>
+    </p:tnLst>
+  </p:timing>
 </p:sld>
 </file>
 
@@ -8460,6 +8886,13 @@
   <p:clrMapOvr>
     <a:masterClrMapping/>
   </p:clrMapOvr>
+  <p:timing>
+    <p:tnLst>
+      <p:par>
+        <p:cTn id="1" dur="indefinite" restart="never" nodeType="tmRoot"/>
+      </p:par>
+    </p:tnLst>
+  </p:timing>
 </p:sld>
 </file>
 
@@ -8744,6 +9177,13 @@
   <p:clrMapOvr>
     <a:masterClrMapping/>
   </p:clrMapOvr>
+  <p:timing>
+    <p:tnLst>
+      <p:par>
+        <p:cTn id="1" dur="indefinite" restart="never" nodeType="tmRoot"/>
+      </p:par>
+    </p:tnLst>
+  </p:timing>
 </p:sld>
 </file>
 
@@ -9977,6 +10417,13 @@
   <p:clrMapOvr>
     <a:masterClrMapping/>
   </p:clrMapOvr>
+  <p:timing>
+    <p:tnLst>
+      <p:par>
+        <p:cTn id="1" dur="indefinite" restart="never" nodeType="tmRoot"/>
+      </p:par>
+    </p:tnLst>
+  </p:timing>
 </p:sld>
 </file>
 
@@ -10879,6 +11326,13 @@
   <p:clrMapOvr>
     <a:masterClrMapping/>
   </p:clrMapOvr>
+  <p:timing>
+    <p:tnLst>
+      <p:par>
+        <p:cTn id="1" dur="indefinite" restart="never" nodeType="tmRoot"/>
+      </p:par>
+    </p:tnLst>
+  </p:timing>
 </p:sld>
 </file>
 
@@ -11773,6 +12227,13 @@
   <p:clrMapOvr>
     <a:masterClrMapping/>
   </p:clrMapOvr>
+  <p:timing>
+    <p:tnLst>
+      <p:par>
+        <p:cTn id="1" dur="indefinite" restart="never" nodeType="tmRoot"/>
+      </p:par>
+    </p:tnLst>
+  </p:timing>
 </p:sld>
 </file>
 
@@ -12367,6 +12828,13 @@
   <p:clrMapOvr>
     <a:masterClrMapping/>
   </p:clrMapOvr>
+  <p:timing>
+    <p:tnLst>
+      <p:par>
+        <p:cTn id="1" dur="indefinite" restart="never" nodeType="tmRoot"/>
+      </p:par>
+    </p:tnLst>
+  </p:timing>
 </p:sld>
 </file>
 
@@ -12776,6 +13244,13 @@
   <p:clrMapOvr>
     <a:masterClrMapping/>
   </p:clrMapOvr>
+  <p:timing>
+    <p:tnLst>
+      <p:par>
+        <p:cTn id="1" dur="indefinite" restart="never" nodeType="tmRoot"/>
+      </p:par>
+    </p:tnLst>
+  </p:timing>
 </p:sld>
 </file>
 
@@ -13124,6 +13599,13 @@
   <p:clrMapOvr>
     <a:masterClrMapping/>
   </p:clrMapOvr>
+  <p:timing>
+    <p:tnLst>
+      <p:par>
+        <p:cTn id="1" dur="indefinite" restart="never" nodeType="tmRoot"/>
+      </p:par>
+    </p:tnLst>
+  </p:timing>
 </p:sld>
 </file>
 
@@ -13196,6 +13678,13 @@
   <p:clrMapOvr>
     <a:masterClrMapping/>
   </p:clrMapOvr>
+  <p:timing>
+    <p:tnLst>
+      <p:par>
+        <p:cTn id="1" dur="indefinite" restart="never" nodeType="tmRoot"/>
+      </p:par>
+    </p:tnLst>
+  </p:timing>
 </p:sld>
 </file>
 
@@ -13349,6 +13838,13 @@
   <p:clrMapOvr>
     <a:masterClrMapping/>
   </p:clrMapOvr>
+  <p:timing>
+    <p:tnLst>
+      <p:par>
+        <p:cTn id="1" dur="indefinite" restart="never" nodeType="tmRoot"/>
+      </p:par>
+    </p:tnLst>
+  </p:timing>
 </p:sld>
 </file>
 
@@ -13550,6 +14046,13 @@
   <p:clrMapOvr>
     <a:masterClrMapping/>
   </p:clrMapOvr>
+  <p:timing>
+    <p:tnLst>
+      <p:par>
+        <p:cTn id="1" dur="indefinite" restart="never" nodeType="tmRoot"/>
+      </p:par>
+    </p:tnLst>
+  </p:timing>
 </p:sld>
 </file>
 
@@ -13639,6 +14142,13 @@
   <p:clrMapOvr>
     <a:masterClrMapping/>
   </p:clrMapOvr>
+  <p:timing>
+    <p:tnLst>
+      <p:par>
+        <p:cTn id="1" dur="indefinite" restart="never" nodeType="tmRoot"/>
+      </p:par>
+    </p:tnLst>
+  </p:timing>
 </p:sld>
 </file>
 
@@ -13839,6 +14349,13 @@
   <p:clrMapOvr>
     <a:masterClrMapping/>
   </p:clrMapOvr>
+  <p:timing>
+    <p:tnLst>
+      <p:par>
+        <p:cTn id="1" dur="indefinite" restart="never" nodeType="tmRoot"/>
+      </p:par>
+    </p:tnLst>
+  </p:timing>
 </p:sld>
 </file>
 
@@ -14879,6 +15396,13 @@
   <p:clrMapOvr>
     <a:masterClrMapping/>
   </p:clrMapOvr>
+  <p:timing>
+    <p:tnLst>
+      <p:par>
+        <p:cTn id="1" dur="indefinite" restart="never" nodeType="tmRoot"/>
+      </p:par>
+    </p:tnLst>
+  </p:timing>
 </p:sld>
 </file>
 
@@ -16012,6 +16536,129 @@
           </a:p>
         </p:txBody>
       </p:sp>
+      <p:sp>
+        <p:nvSpPr>
+          <p:cNvPr id="5" name="Down Arrow 4"/>
+          <p:cNvSpPr/>
+          <p:nvPr/>
+        </p:nvSpPr>
+        <p:spPr>
+          <a:xfrm rot="6589927">
+            <a:off x="7053734" y="3517908"/>
+            <a:ext cx="220980" cy="1810268"/>
+          </a:xfrm>
+          <a:prstGeom prst="downArrow">
+            <a:avLst>
+              <a:gd name="adj1" fmla="val 57019"/>
+              <a:gd name="adj2" fmla="val 50000"/>
+            </a:avLst>
+          </a:prstGeom>
+        </p:spPr>
+        <p:style>
+          <a:lnRef idx="2">
+            <a:schemeClr val="accent1">
+              <a:shade val="50000"/>
+            </a:schemeClr>
+          </a:lnRef>
+          <a:fillRef idx="1">
+            <a:schemeClr val="accent1"/>
+          </a:fillRef>
+          <a:effectRef idx="0">
+            <a:schemeClr val="accent1"/>
+          </a:effectRef>
+          <a:fontRef idx="minor">
+            <a:schemeClr val="lt1"/>
+          </a:fontRef>
+        </p:style>
+        <p:txBody>
+          <a:bodyPr rtlCol="0" anchor="ctr"/>
+          <a:lstStyle/>
+          <a:p>
+            <a:pPr algn="ctr"/>
+            <a:endParaRPr lang="da-DK"/>
+          </a:p>
+        </p:txBody>
+      </p:sp>
+      <p:sp>
+        <p:nvSpPr>
+          <p:cNvPr id="6" name="Down Arrow 5"/>
+          <p:cNvSpPr/>
+          <p:nvPr/>
+        </p:nvSpPr>
+        <p:spPr>
+          <a:xfrm rot="5005834">
+            <a:off x="7322274" y="3033698"/>
+            <a:ext cx="220980" cy="1521656"/>
+          </a:xfrm>
+          <a:prstGeom prst="downArrow">
+            <a:avLst/>
+          </a:prstGeom>
+        </p:spPr>
+        <p:style>
+          <a:lnRef idx="2">
+            <a:schemeClr val="accent1">
+              <a:shade val="50000"/>
+            </a:schemeClr>
+          </a:lnRef>
+          <a:fillRef idx="1">
+            <a:schemeClr val="accent1"/>
+          </a:fillRef>
+          <a:effectRef idx="0">
+            <a:schemeClr val="accent1"/>
+          </a:effectRef>
+          <a:fontRef idx="minor">
+            <a:schemeClr val="lt1"/>
+          </a:fontRef>
+        </p:style>
+        <p:txBody>
+          <a:bodyPr rtlCol="0" anchor="ctr"/>
+          <a:lstStyle/>
+          <a:p>
+            <a:pPr algn="ctr"/>
+            <a:endParaRPr lang="da-DK"/>
+          </a:p>
+        </p:txBody>
+      </p:sp>
+      <p:sp>
+        <p:nvSpPr>
+          <p:cNvPr id="7" name="Down Arrow 6"/>
+          <p:cNvSpPr/>
+          <p:nvPr/>
+        </p:nvSpPr>
+        <p:spPr>
+          <a:xfrm rot="4110891">
+            <a:off x="7336419" y="1127234"/>
+            <a:ext cx="220980" cy="1534338"/>
+          </a:xfrm>
+          <a:prstGeom prst="downArrow">
+            <a:avLst/>
+          </a:prstGeom>
+        </p:spPr>
+        <p:style>
+          <a:lnRef idx="2">
+            <a:schemeClr val="accent1">
+              <a:shade val="50000"/>
+            </a:schemeClr>
+          </a:lnRef>
+          <a:fillRef idx="1">
+            <a:schemeClr val="accent1"/>
+          </a:fillRef>
+          <a:effectRef idx="0">
+            <a:schemeClr val="accent1"/>
+          </a:effectRef>
+          <a:fontRef idx="minor">
+            <a:schemeClr val="lt1"/>
+          </a:fontRef>
+        </p:style>
+        <p:txBody>
+          <a:bodyPr rtlCol="0" anchor="ctr"/>
+          <a:lstStyle/>
+          <a:p>
+            <a:pPr algn="ctr"/>
+            <a:endParaRPr lang="da-DK"/>
+          </a:p>
+        </p:txBody>
+      </p:sp>
     </p:spTree>
     <p:extLst>
       <p:ext uri="{BB962C8B-B14F-4D97-AF65-F5344CB8AC3E}">
@@ -16022,6 +16669,13 @@
   <p:clrMapOvr>
     <a:masterClrMapping/>
   </p:clrMapOvr>
+  <p:timing>
+    <p:tnLst>
+      <p:par>
+        <p:cTn id="1" dur="indefinite" restart="never" nodeType="tmRoot"/>
+      </p:par>
+    </p:tnLst>
+  </p:timing>
 </p:sld>
 </file>
 
@@ -16114,7 +16768,7 @@
               <a:t>AutoResetEvent</a:t>
             </a:r>
             <a:r>
-              <a:rPr lang="en-US" dirty="0"/>
+              <a:rPr lang="en-US" dirty="0" smtClean="0"/>
               <a:t>.</a:t>
             </a:r>
           </a:p>
@@ -16122,7 +16776,31 @@
             <a:pPr marL="0" indent="0">
               <a:buNone/>
             </a:pPr>
-            <a:endParaRPr lang="en-US"/>
+            <a:endParaRPr lang="en-US" dirty="0" smtClean="0"/>
+          </a:p>
+          <a:p>
+            <a:pPr marL="0" indent="0">
+              <a:buNone/>
+            </a:pPr>
+            <a:r>
+              <a:rPr lang="en-US" dirty="0" smtClean="0"/>
+              <a:t>The </a:t>
+            </a:r>
+            <a:r>
+              <a:rPr lang="en-US" dirty="0" err="1" smtClean="0"/>
+              <a:t>AutoResetEvent</a:t>
+            </a:r>
+            <a:r>
+              <a:rPr lang="en-US" dirty="0" smtClean="0"/>
+              <a:t> is ‘not set’ when created.</a:t>
+            </a:r>
+            <a:endParaRPr lang="en-US" dirty="0"/>
+          </a:p>
+          <a:p>
+            <a:pPr marL="0" indent="0">
+              <a:buNone/>
+            </a:pPr>
+            <a:endParaRPr lang="en-US" dirty="0"/>
           </a:p>
         </p:txBody>
       </p:sp>
@@ -17083,6 +17761,49 @@
           </a:p>
         </p:txBody>
       </p:sp>
+      <p:sp>
+        <p:nvSpPr>
+          <p:cNvPr id="5" name="Down Arrow 4"/>
+          <p:cNvSpPr/>
+          <p:nvPr/>
+        </p:nvSpPr>
+        <p:spPr>
+          <a:xfrm rot="7468438">
+            <a:off x="7453622" y="2583489"/>
+            <a:ext cx="220980" cy="1488489"/>
+          </a:xfrm>
+          <a:prstGeom prst="downArrow">
+            <a:avLst>
+              <a:gd name="adj1" fmla="val 54665"/>
+              <a:gd name="adj2" fmla="val 50000"/>
+            </a:avLst>
+          </a:prstGeom>
+        </p:spPr>
+        <p:style>
+          <a:lnRef idx="2">
+            <a:schemeClr val="accent1">
+              <a:shade val="50000"/>
+            </a:schemeClr>
+          </a:lnRef>
+          <a:fillRef idx="1">
+            <a:schemeClr val="accent1"/>
+          </a:fillRef>
+          <a:effectRef idx="0">
+            <a:schemeClr val="accent1"/>
+          </a:effectRef>
+          <a:fontRef idx="minor">
+            <a:schemeClr val="lt1"/>
+          </a:fontRef>
+        </p:style>
+        <p:txBody>
+          <a:bodyPr rtlCol="0" anchor="ctr"/>
+          <a:lstStyle/>
+          <a:p>
+            <a:pPr algn="ctr"/>
+            <a:endParaRPr lang="da-DK"/>
+          </a:p>
+        </p:txBody>
+      </p:sp>
     </p:spTree>
     <p:extLst>
       <p:ext uri="{BB962C8B-B14F-4D97-AF65-F5344CB8AC3E}">
@@ -17093,10 +17814,2574 @@
   <p:clrMapOvr>
     <a:masterClrMapping/>
   </p:clrMapOvr>
+  <p:timing>
+    <p:tnLst>
+      <p:par>
+        <p:cTn id="1" dur="indefinite" restart="never" nodeType="tmRoot"/>
+      </p:par>
+    </p:tnLst>
+  </p:timing>
 </p:sld>
 </file>
 
 <file path=ppt/slides/slide34.xml><?xml version="1.0" encoding="utf-8"?>
+<p:sld xmlns:a="http://schemas.openxmlformats.org/drawingml/2006/main" xmlns:r="http://schemas.openxmlformats.org/officeDocument/2006/relationships" xmlns:p="http://schemas.openxmlformats.org/presentationml/2006/main">
+  <p:cSld>
+    <p:spTree>
+      <p:nvGrpSpPr>
+        <p:cNvPr id="1" name=""/>
+        <p:cNvGrpSpPr/>
+        <p:nvPr/>
+      </p:nvGrpSpPr>
+      <p:grpSpPr>
+        <a:xfrm>
+          <a:off x="0" y="0"/>
+          <a:ext cx="0" cy="0"/>
+          <a:chOff x="0" y="0"/>
+          <a:chExt cx="0" cy="0"/>
+        </a:xfrm>
+      </p:grpSpPr>
+      <p:sp>
+        <p:nvSpPr>
+          <p:cNvPr id="4" name="Title 3"/>
+          <p:cNvSpPr>
+            <a:spLocks noGrp="1"/>
+          </p:cNvSpPr>
+          <p:nvPr>
+            <p:ph type="title"/>
+          </p:nvPr>
+        </p:nvSpPr>
+        <p:spPr/>
+        <p:txBody>
+          <a:bodyPr/>
+          <a:lstStyle/>
+          <a:p>
+            <a:r>
+              <a:rPr lang="en-US" dirty="0" err="1" smtClean="0"/>
+              <a:t>GoF</a:t>
+            </a:r>
+            <a:r>
+              <a:rPr lang="en-US" dirty="0" smtClean="0"/>
+              <a:t> Observer with threads</a:t>
+            </a:r>
+            <a:endParaRPr lang="da-DK" dirty="0"/>
+          </a:p>
+        </p:txBody>
+      </p:sp>
+      <p:sp>
+        <p:nvSpPr>
+          <p:cNvPr id="5" name="Text Placeholder 4"/>
+          <p:cNvSpPr>
+            <a:spLocks noGrp="1"/>
+          </p:cNvSpPr>
+          <p:nvPr>
+            <p:ph type="body" idx="1"/>
+          </p:nvPr>
+        </p:nvSpPr>
+        <p:spPr/>
+        <p:txBody>
+          <a:bodyPr/>
+          <a:lstStyle/>
+          <a:p>
+            <a:endParaRPr lang="da-DK" dirty="0"/>
+          </a:p>
+        </p:txBody>
+      </p:sp>
+    </p:spTree>
+    <p:extLst>
+      <p:ext uri="{BB962C8B-B14F-4D97-AF65-F5344CB8AC3E}">
+        <p14:creationId xmlns:p14="http://schemas.microsoft.com/office/powerpoint/2010/main" val="2637468862"/>
+      </p:ext>
+    </p:extLst>
+  </p:cSld>
+  <p:clrMapOvr>
+    <a:masterClrMapping/>
+  </p:clrMapOvr>
+  <p:timing>
+    <p:tnLst>
+      <p:par>
+        <p:cTn id="1" dur="indefinite" restart="never" nodeType="tmRoot"/>
+      </p:par>
+    </p:tnLst>
+  </p:timing>
+</p:sld>
+</file>
+
+<file path=ppt/slides/slide35.xml><?xml version="1.0" encoding="utf-8"?>
+<p:sld xmlns:a="http://schemas.openxmlformats.org/drawingml/2006/main" xmlns:r="http://schemas.openxmlformats.org/officeDocument/2006/relationships" xmlns:p="http://schemas.openxmlformats.org/presentationml/2006/main">
+  <p:cSld>
+    <p:spTree>
+      <p:nvGrpSpPr>
+        <p:cNvPr id="1" name=""/>
+        <p:cNvGrpSpPr/>
+        <p:nvPr/>
+      </p:nvGrpSpPr>
+      <p:grpSpPr>
+        <a:xfrm>
+          <a:off x="0" y="0"/>
+          <a:ext cx="0" cy="0"/>
+          <a:chOff x="0" y="0"/>
+          <a:chExt cx="0" cy="0"/>
+        </a:xfrm>
+      </p:grpSpPr>
+      <p:sp>
+        <p:nvSpPr>
+          <p:cNvPr id="4" name="Title 3"/>
+          <p:cNvSpPr>
+            <a:spLocks noGrp="1"/>
+          </p:cNvSpPr>
+          <p:nvPr>
+            <p:ph type="title"/>
+          </p:nvPr>
+        </p:nvSpPr>
+        <p:spPr/>
+        <p:txBody>
+          <a:bodyPr/>
+          <a:lstStyle/>
+          <a:p>
+            <a:endParaRPr lang="da-DK"/>
+          </a:p>
+        </p:txBody>
+      </p:sp>
+      <p:sp>
+        <p:nvSpPr>
+          <p:cNvPr id="5" name="Content Placeholder 4"/>
+          <p:cNvSpPr>
+            <a:spLocks noGrp="1"/>
+          </p:cNvSpPr>
+          <p:nvPr>
+            <p:ph idx="1"/>
+          </p:nvPr>
+        </p:nvSpPr>
+        <p:spPr>
+          <a:xfrm>
+            <a:off x="7467600" y="1356706"/>
+            <a:ext cx="3886200" cy="4860960"/>
+          </a:xfrm>
+        </p:spPr>
+        <p:txBody>
+          <a:bodyPr>
+            <a:normAutofit/>
+          </a:bodyPr>
+          <a:lstStyle/>
+          <a:p>
+            <a:pPr marL="0" indent="0">
+              <a:buNone/>
+            </a:pPr>
+            <a:r>
+              <a:rPr lang="en-US" dirty="0" smtClean="0"/>
+              <a:t>What to do, if we want to decouple the </a:t>
+            </a:r>
+            <a:r>
+              <a:rPr lang="en-US" dirty="0" err="1" smtClean="0"/>
+              <a:t>WaterLevelMonitor</a:t>
+            </a:r>
+            <a:r>
+              <a:rPr lang="en-US" dirty="0" smtClean="0"/>
+              <a:t> from the </a:t>
+            </a:r>
+            <a:r>
+              <a:rPr lang="en-US" dirty="0" err="1" smtClean="0"/>
+              <a:t>PumpController</a:t>
+            </a:r>
+            <a:r>
+              <a:rPr lang="en-US" dirty="0" smtClean="0"/>
+              <a:t> using the </a:t>
+            </a:r>
+            <a:r>
+              <a:rPr lang="en-US" dirty="0" err="1" smtClean="0"/>
+              <a:t>GoF</a:t>
+            </a:r>
+            <a:r>
+              <a:rPr lang="en-US" dirty="0" smtClean="0"/>
+              <a:t> Observer pattern?</a:t>
+            </a:r>
+            <a:endParaRPr lang="en-US" dirty="0"/>
+          </a:p>
+        </p:txBody>
+      </p:sp>
+      <p:pic>
+        <p:nvPicPr>
+          <p:cNvPr id="6" name="Picture 5"/>
+          <p:cNvPicPr>
+            <a:picLocks noChangeAspect="1"/>
+          </p:cNvPicPr>
+          <p:nvPr/>
+        </p:nvPicPr>
+        <p:blipFill>
+          <a:blip r:embed="rId3"/>
+          <a:stretch>
+            <a:fillRect/>
+          </a:stretch>
+        </p:blipFill>
+        <p:spPr>
+          <a:xfrm>
+            <a:off x="1085913" y="1600546"/>
+            <a:ext cx="4954266" cy="3565469"/>
+          </a:xfrm>
+          <a:prstGeom prst="rect">
+            <a:avLst/>
+          </a:prstGeom>
+        </p:spPr>
+      </p:pic>
+    </p:spTree>
+    <p:extLst>
+      <p:ext uri="{BB962C8B-B14F-4D97-AF65-F5344CB8AC3E}">
+        <p14:creationId xmlns:p14="http://schemas.microsoft.com/office/powerpoint/2010/main" val="878619283"/>
+      </p:ext>
+    </p:extLst>
+  </p:cSld>
+  <p:clrMapOvr>
+    <a:masterClrMapping/>
+  </p:clrMapOvr>
+  <p:timing>
+    <p:tnLst>
+      <p:par>
+        <p:cTn id="1" dur="indefinite" restart="never" nodeType="tmRoot"/>
+      </p:par>
+    </p:tnLst>
+  </p:timing>
+</p:sld>
+</file>
+
+<file path=ppt/slides/slide36.xml><?xml version="1.0" encoding="utf-8"?>
+<p:sld xmlns:a="http://schemas.openxmlformats.org/drawingml/2006/main" xmlns:r="http://schemas.openxmlformats.org/officeDocument/2006/relationships" xmlns:p="http://schemas.openxmlformats.org/presentationml/2006/main">
+  <p:cSld>
+    <p:spTree>
+      <p:nvGrpSpPr>
+        <p:cNvPr id="1" name=""/>
+        <p:cNvGrpSpPr/>
+        <p:nvPr/>
+      </p:nvGrpSpPr>
+      <p:grpSpPr>
+        <a:xfrm>
+          <a:off x="0" y="0"/>
+          <a:ext cx="0" cy="0"/>
+          <a:chOff x="0" y="0"/>
+          <a:chExt cx="0" cy="0"/>
+        </a:xfrm>
+      </p:grpSpPr>
+      <p:sp>
+        <p:nvSpPr>
+          <p:cNvPr id="4" name="Title 3"/>
+          <p:cNvSpPr>
+            <a:spLocks noGrp="1"/>
+          </p:cNvSpPr>
+          <p:nvPr>
+            <p:ph type="title"/>
+          </p:nvPr>
+        </p:nvSpPr>
+        <p:spPr/>
+        <p:txBody>
+          <a:bodyPr/>
+          <a:lstStyle/>
+          <a:p>
+            <a:endParaRPr lang="da-DK"/>
+          </a:p>
+        </p:txBody>
+      </p:sp>
+      <p:pic>
+        <p:nvPicPr>
+          <p:cNvPr id="7" name="Picture 6"/>
+          <p:cNvPicPr>
+            <a:picLocks noChangeAspect="1"/>
+          </p:cNvPicPr>
+          <p:nvPr/>
+        </p:nvPicPr>
+        <p:blipFill>
+          <a:blip r:embed="rId3"/>
+          <a:stretch>
+            <a:fillRect/>
+          </a:stretch>
+        </p:blipFill>
+        <p:spPr>
+          <a:xfrm>
+            <a:off x="838200" y="2507312"/>
+            <a:ext cx="7963731" cy="3896886"/>
+          </a:xfrm>
+          <a:prstGeom prst="rect">
+            <a:avLst/>
+          </a:prstGeom>
+        </p:spPr>
+      </p:pic>
+      <p:sp>
+        <p:nvSpPr>
+          <p:cNvPr id="12" name="Content Placeholder 4"/>
+          <p:cNvSpPr txBox="1">
+            <a:spLocks/>
+          </p:cNvSpPr>
+          <p:nvPr/>
+        </p:nvSpPr>
+        <p:spPr>
+          <a:xfrm>
+            <a:off x="7467600" y="1356706"/>
+            <a:ext cx="3886200" cy="4860960"/>
+          </a:xfrm>
+          <a:prstGeom prst="rect">
+            <a:avLst/>
+          </a:prstGeom>
+        </p:spPr>
+        <p:txBody>
+          <a:bodyPr vert="horz" lIns="91440" tIns="45720" rIns="91440" bIns="45720" rtlCol="0">
+            <a:normAutofit/>
+          </a:bodyPr>
+          <a:lstStyle>
+            <a:lvl1pPr marL="228600" indent="-228600" algn="l" defTabSz="914400" rtl="0" eaLnBrk="1" latinLnBrk="0" hangingPunct="1">
+              <a:lnSpc>
+                <a:spcPct val="90000"/>
+              </a:lnSpc>
+              <a:spcBef>
+                <a:spcPts val="1000"/>
+              </a:spcBef>
+              <a:buFont typeface="Arial" panose="020B0604020202020204" pitchFamily="34" charset="0"/>
+              <a:buChar char="•"/>
+              <a:defRPr sz="2800" kern="1200">
+                <a:solidFill>
+                  <a:schemeClr val="tx1"/>
+                </a:solidFill>
+                <a:latin typeface="Gill Sans MT" panose="020B0502020104020203" pitchFamily="34" charset="0"/>
+                <a:ea typeface="+mn-ea"/>
+                <a:cs typeface="+mn-cs"/>
+              </a:defRPr>
+            </a:lvl1pPr>
+            <a:lvl2pPr marL="685800" indent="-228600" algn="l" defTabSz="914400" rtl="0" eaLnBrk="1" latinLnBrk="0" hangingPunct="1">
+              <a:lnSpc>
+                <a:spcPct val="90000"/>
+              </a:lnSpc>
+              <a:spcBef>
+                <a:spcPts val="500"/>
+              </a:spcBef>
+              <a:buFont typeface="Arial" panose="020B0604020202020204" pitchFamily="34" charset="0"/>
+              <a:buChar char="•"/>
+              <a:defRPr sz="2400" kern="1200">
+                <a:solidFill>
+                  <a:schemeClr val="tx1"/>
+                </a:solidFill>
+                <a:latin typeface="Gill Sans MT" panose="020B0502020104020203" pitchFamily="34" charset="0"/>
+                <a:ea typeface="+mn-ea"/>
+                <a:cs typeface="+mn-cs"/>
+              </a:defRPr>
+            </a:lvl2pPr>
+            <a:lvl3pPr marL="1143000" indent="-228600" algn="l" defTabSz="914400" rtl="0" eaLnBrk="1" latinLnBrk="0" hangingPunct="1">
+              <a:lnSpc>
+                <a:spcPct val="90000"/>
+              </a:lnSpc>
+              <a:spcBef>
+                <a:spcPts val="500"/>
+              </a:spcBef>
+              <a:buFont typeface="Arial" panose="020B0604020202020204" pitchFamily="34" charset="0"/>
+              <a:buChar char="•"/>
+              <a:defRPr sz="2000" kern="1200">
+                <a:solidFill>
+                  <a:schemeClr val="tx1"/>
+                </a:solidFill>
+                <a:latin typeface="Gill Sans MT" panose="020B0502020104020203" pitchFamily="34" charset="0"/>
+                <a:ea typeface="+mn-ea"/>
+                <a:cs typeface="+mn-cs"/>
+              </a:defRPr>
+            </a:lvl3pPr>
+            <a:lvl4pPr marL="1600200" indent="-228600" algn="l" defTabSz="914400" rtl="0" eaLnBrk="1" latinLnBrk="0" hangingPunct="1">
+              <a:lnSpc>
+                <a:spcPct val="90000"/>
+              </a:lnSpc>
+              <a:spcBef>
+                <a:spcPts val="500"/>
+              </a:spcBef>
+              <a:buFont typeface="Arial" panose="020B0604020202020204" pitchFamily="34" charset="0"/>
+              <a:buChar char="•"/>
+              <a:defRPr sz="1800" kern="1200">
+                <a:solidFill>
+                  <a:schemeClr val="tx1"/>
+                </a:solidFill>
+                <a:latin typeface="Gill Sans MT" panose="020B0502020104020203" pitchFamily="34" charset="0"/>
+                <a:ea typeface="+mn-ea"/>
+                <a:cs typeface="+mn-cs"/>
+              </a:defRPr>
+            </a:lvl4pPr>
+            <a:lvl5pPr marL="2057400" indent="-228600" algn="l" defTabSz="914400" rtl="0" eaLnBrk="1" latinLnBrk="0" hangingPunct="1">
+              <a:lnSpc>
+                <a:spcPct val="90000"/>
+              </a:lnSpc>
+              <a:spcBef>
+                <a:spcPts val="500"/>
+              </a:spcBef>
+              <a:buFont typeface="Arial" panose="020B0604020202020204" pitchFamily="34" charset="0"/>
+              <a:buChar char="•"/>
+              <a:defRPr sz="1800" kern="1200">
+                <a:solidFill>
+                  <a:schemeClr val="tx1"/>
+                </a:solidFill>
+                <a:latin typeface="Gill Sans MT" panose="020B0502020104020203" pitchFamily="34" charset="0"/>
+                <a:ea typeface="+mn-ea"/>
+                <a:cs typeface="+mn-cs"/>
+              </a:defRPr>
+            </a:lvl5pPr>
+            <a:lvl6pPr marL="2514600" indent="-228600" algn="l" defTabSz="914400" rtl="0" eaLnBrk="1" latinLnBrk="0" hangingPunct="1">
+              <a:lnSpc>
+                <a:spcPct val="90000"/>
+              </a:lnSpc>
+              <a:spcBef>
+                <a:spcPts val="500"/>
+              </a:spcBef>
+              <a:buFont typeface="Arial" panose="020B0604020202020204" pitchFamily="34" charset="0"/>
+              <a:buChar char="•"/>
+              <a:defRPr sz="1800" kern="1200">
+                <a:solidFill>
+                  <a:schemeClr val="tx1"/>
+                </a:solidFill>
+                <a:latin typeface="+mn-lt"/>
+                <a:ea typeface="+mn-ea"/>
+                <a:cs typeface="+mn-cs"/>
+              </a:defRPr>
+            </a:lvl6pPr>
+            <a:lvl7pPr marL="2971800" indent="-228600" algn="l" defTabSz="914400" rtl="0" eaLnBrk="1" latinLnBrk="0" hangingPunct="1">
+              <a:lnSpc>
+                <a:spcPct val="90000"/>
+              </a:lnSpc>
+              <a:spcBef>
+                <a:spcPts val="500"/>
+              </a:spcBef>
+              <a:buFont typeface="Arial" panose="020B0604020202020204" pitchFamily="34" charset="0"/>
+              <a:buChar char="•"/>
+              <a:defRPr sz="1800" kern="1200">
+                <a:solidFill>
+                  <a:schemeClr val="tx1"/>
+                </a:solidFill>
+                <a:latin typeface="+mn-lt"/>
+                <a:ea typeface="+mn-ea"/>
+                <a:cs typeface="+mn-cs"/>
+              </a:defRPr>
+            </a:lvl7pPr>
+            <a:lvl8pPr marL="3429000" indent="-228600" algn="l" defTabSz="914400" rtl="0" eaLnBrk="1" latinLnBrk="0" hangingPunct="1">
+              <a:lnSpc>
+                <a:spcPct val="90000"/>
+              </a:lnSpc>
+              <a:spcBef>
+                <a:spcPts val="500"/>
+              </a:spcBef>
+              <a:buFont typeface="Arial" panose="020B0604020202020204" pitchFamily="34" charset="0"/>
+              <a:buChar char="•"/>
+              <a:defRPr sz="1800" kern="1200">
+                <a:solidFill>
+                  <a:schemeClr val="tx1"/>
+                </a:solidFill>
+                <a:latin typeface="+mn-lt"/>
+                <a:ea typeface="+mn-ea"/>
+                <a:cs typeface="+mn-cs"/>
+              </a:defRPr>
+            </a:lvl8pPr>
+            <a:lvl9pPr marL="3886200" indent="-228600" algn="l" defTabSz="914400" rtl="0" eaLnBrk="1" latinLnBrk="0" hangingPunct="1">
+              <a:lnSpc>
+                <a:spcPct val="90000"/>
+              </a:lnSpc>
+              <a:spcBef>
+                <a:spcPts val="500"/>
+              </a:spcBef>
+              <a:buFont typeface="Arial" panose="020B0604020202020204" pitchFamily="34" charset="0"/>
+              <a:buChar char="•"/>
+              <a:defRPr sz="1800" kern="1200">
+                <a:solidFill>
+                  <a:schemeClr val="tx1"/>
+                </a:solidFill>
+                <a:latin typeface="+mn-lt"/>
+                <a:ea typeface="+mn-ea"/>
+                <a:cs typeface="+mn-cs"/>
+              </a:defRPr>
+            </a:lvl9pPr>
+          </a:lstStyle>
+          <a:p>
+            <a:pPr marL="0" indent="0">
+              <a:buFont typeface="Arial" panose="020B0604020202020204" pitchFamily="34" charset="0"/>
+              <a:buNone/>
+            </a:pPr>
+            <a:r>
+              <a:rPr lang="en-US" smtClean="0"/>
+              <a:t>What to do, if we want to decouple the WaterLevelMonitor from the PumpController using the GoF Observer pattern?</a:t>
+            </a:r>
+            <a:endParaRPr lang="en-US" dirty="0"/>
+          </a:p>
+        </p:txBody>
+      </p:sp>
+    </p:spTree>
+    <p:extLst>
+      <p:ext uri="{BB962C8B-B14F-4D97-AF65-F5344CB8AC3E}">
+        <p14:creationId xmlns:p14="http://schemas.microsoft.com/office/powerpoint/2010/main" val="371992738"/>
+      </p:ext>
+    </p:extLst>
+  </p:cSld>
+  <p:clrMapOvr>
+    <a:masterClrMapping/>
+  </p:clrMapOvr>
+  <p:timing>
+    <p:tnLst>
+      <p:par>
+        <p:cTn id="1" dur="indefinite" restart="never" nodeType="tmRoot"/>
+      </p:par>
+    </p:tnLst>
+  </p:timing>
+</p:sld>
+</file>
+
+<file path=ppt/slides/slide37.xml><?xml version="1.0" encoding="utf-8"?>
+<p:sld xmlns:a="http://schemas.openxmlformats.org/drawingml/2006/main" xmlns:r="http://schemas.openxmlformats.org/officeDocument/2006/relationships" xmlns:p="http://schemas.openxmlformats.org/presentationml/2006/main">
+  <p:cSld>
+    <p:spTree>
+      <p:nvGrpSpPr>
+        <p:cNvPr id="1" name=""/>
+        <p:cNvGrpSpPr/>
+        <p:nvPr/>
+      </p:nvGrpSpPr>
+      <p:grpSpPr>
+        <a:xfrm>
+          <a:off x="0" y="0"/>
+          <a:ext cx="0" cy="0"/>
+          <a:chOff x="0" y="0"/>
+          <a:chExt cx="0" cy="0"/>
+        </a:xfrm>
+      </p:grpSpPr>
+      <p:sp>
+        <p:nvSpPr>
+          <p:cNvPr id="2" name="Title 1"/>
+          <p:cNvSpPr>
+            <a:spLocks noGrp="1"/>
+          </p:cNvSpPr>
+          <p:nvPr>
+            <p:ph type="title"/>
+          </p:nvPr>
+        </p:nvSpPr>
+        <p:spPr/>
+        <p:txBody>
+          <a:bodyPr/>
+          <a:lstStyle/>
+          <a:p>
+            <a:r>
+              <a:rPr lang="da-DK" dirty="0" err="1" smtClean="0"/>
+              <a:t>PumpController</a:t>
+            </a:r>
+            <a:r>
+              <a:rPr lang="da-DK" dirty="0" smtClean="0"/>
+              <a:t> as Observer</a:t>
+            </a:r>
+            <a:endParaRPr lang="da-DK" dirty="0"/>
+          </a:p>
+        </p:txBody>
+      </p:sp>
+      <p:sp>
+        <p:nvSpPr>
+          <p:cNvPr id="4" name="Rectangle 3"/>
+          <p:cNvSpPr/>
+          <p:nvPr/>
+        </p:nvSpPr>
+        <p:spPr>
+          <a:xfrm>
+            <a:off x="152400" y="1311965"/>
+            <a:ext cx="5631180" cy="5400120"/>
+          </a:xfrm>
+          <a:prstGeom prst="rect">
+            <a:avLst/>
+          </a:prstGeom>
+          <a:solidFill>
+            <a:schemeClr val="bg2"/>
+          </a:solidFill>
+        </p:spPr>
+        <p:style>
+          <a:lnRef idx="2">
+            <a:schemeClr val="accent1">
+              <a:shade val="50000"/>
+            </a:schemeClr>
+          </a:lnRef>
+          <a:fillRef idx="1">
+            <a:schemeClr val="accent1"/>
+          </a:fillRef>
+          <a:effectRef idx="0">
+            <a:schemeClr val="accent1"/>
+          </a:effectRef>
+          <a:fontRef idx="minor">
+            <a:schemeClr val="lt1"/>
+          </a:fontRef>
+        </p:style>
+        <p:txBody>
+          <a:bodyPr rtlCol="0" anchor="ctr"/>
+          <a:lstStyle/>
+          <a:p>
+            <a:r>
+              <a:rPr lang="da-DK" sz="1200" dirty="0">
+                <a:solidFill>
+                  <a:srgbClr val="0000FF"/>
+                </a:solidFill>
+                <a:latin typeface="Cascadia Mono" panose="020B0609020000020004" pitchFamily="49" charset="0"/>
+              </a:rPr>
+              <a:t>public</a:t>
+            </a:r>
+            <a:r>
+              <a:rPr lang="da-DK" sz="1200" dirty="0">
+                <a:solidFill>
+                  <a:srgbClr val="000000"/>
+                </a:solidFill>
+                <a:latin typeface="Cascadia Mono" panose="020B0609020000020004" pitchFamily="49" charset="0"/>
+              </a:rPr>
+              <a:t> </a:t>
+            </a:r>
+            <a:r>
+              <a:rPr lang="da-DK" sz="1200" dirty="0" err="1">
+                <a:solidFill>
+                  <a:srgbClr val="0000FF"/>
+                </a:solidFill>
+                <a:latin typeface="Cascadia Mono" panose="020B0609020000020004" pitchFamily="49" charset="0"/>
+              </a:rPr>
+              <a:t>class</a:t>
+            </a:r>
+            <a:r>
+              <a:rPr lang="da-DK" sz="1200" dirty="0">
+                <a:solidFill>
+                  <a:srgbClr val="000000"/>
+                </a:solidFill>
+                <a:latin typeface="Cascadia Mono" panose="020B0609020000020004" pitchFamily="49" charset="0"/>
+              </a:rPr>
+              <a:t> </a:t>
+            </a:r>
+            <a:r>
+              <a:rPr lang="da-DK" sz="1200" dirty="0" err="1">
+                <a:solidFill>
+                  <a:srgbClr val="2B91AF"/>
+                </a:solidFill>
+                <a:latin typeface="Cascadia Mono" panose="020B0609020000020004" pitchFamily="49" charset="0"/>
+              </a:rPr>
+              <a:t>PumpController</a:t>
+            </a:r>
+            <a:r>
+              <a:rPr lang="da-DK" sz="1200" dirty="0">
+                <a:solidFill>
+                  <a:srgbClr val="000000"/>
+                </a:solidFill>
+                <a:latin typeface="Cascadia Mono" panose="020B0609020000020004" pitchFamily="49" charset="0"/>
+              </a:rPr>
+              <a:t> : </a:t>
+            </a:r>
+            <a:r>
+              <a:rPr lang="da-DK" sz="1200" dirty="0" err="1">
+                <a:solidFill>
+                  <a:srgbClr val="000000"/>
+                </a:solidFill>
+                <a:latin typeface="Cascadia Mono" panose="020B0609020000020004" pitchFamily="49" charset="0"/>
+              </a:rPr>
+              <a:t>IWaterLevelObserver</a:t>
+            </a:r>
+            <a:endParaRPr lang="da-DK" sz="1200" dirty="0">
+              <a:solidFill>
+                <a:srgbClr val="000000"/>
+              </a:solidFill>
+              <a:latin typeface="Cascadia Mono" panose="020B0609020000020004" pitchFamily="49" charset="0"/>
+            </a:endParaRPr>
+          </a:p>
+          <a:p>
+            <a:r>
+              <a:rPr lang="da-DK" sz="1200" dirty="0">
+                <a:solidFill>
+                  <a:srgbClr val="000000"/>
+                </a:solidFill>
+                <a:latin typeface="Cascadia Mono" panose="020B0609020000020004" pitchFamily="49" charset="0"/>
+              </a:rPr>
+              <a:t>{</a:t>
+            </a:r>
+          </a:p>
+          <a:p>
+            <a:r>
+              <a:rPr lang="da-DK" sz="1200" dirty="0">
+                <a:solidFill>
+                  <a:srgbClr val="000000"/>
+                </a:solidFill>
+                <a:latin typeface="Cascadia Mono" panose="020B0609020000020004" pitchFamily="49" charset="0"/>
+              </a:rPr>
+              <a:t>    </a:t>
+            </a:r>
+            <a:r>
+              <a:rPr lang="da-DK" sz="1200" dirty="0">
+                <a:solidFill>
+                  <a:srgbClr val="0000FF"/>
+                </a:solidFill>
+                <a:latin typeface="Cascadia Mono" panose="020B0609020000020004" pitchFamily="49" charset="0"/>
+              </a:rPr>
+              <a:t>private</a:t>
+            </a:r>
+            <a:r>
+              <a:rPr lang="da-DK" sz="1200" dirty="0">
+                <a:solidFill>
+                  <a:srgbClr val="000000"/>
+                </a:solidFill>
+                <a:latin typeface="Cascadia Mono" panose="020B0609020000020004" pitchFamily="49" charset="0"/>
+              </a:rPr>
+              <a:t> </a:t>
+            </a:r>
+            <a:r>
+              <a:rPr lang="da-DK" sz="1200" dirty="0" err="1">
+                <a:solidFill>
+                  <a:srgbClr val="0000FF"/>
+                </a:solidFill>
+                <a:latin typeface="Cascadia Mono" panose="020B0609020000020004" pitchFamily="49" charset="0"/>
+              </a:rPr>
+              <a:t>readonly</a:t>
+            </a:r>
+            <a:r>
+              <a:rPr lang="da-DK" sz="1200" dirty="0">
+                <a:solidFill>
+                  <a:srgbClr val="000000"/>
+                </a:solidFill>
+                <a:latin typeface="Cascadia Mono" panose="020B0609020000020004" pitchFamily="49" charset="0"/>
+              </a:rPr>
+              <a:t> </a:t>
+            </a:r>
+            <a:r>
+              <a:rPr lang="da-DK" sz="1200" dirty="0" err="1">
+                <a:solidFill>
+                  <a:srgbClr val="000000"/>
+                </a:solidFill>
+                <a:latin typeface="Cascadia Mono" panose="020B0609020000020004" pitchFamily="49" charset="0"/>
+              </a:rPr>
+              <a:t>AutoResetEvent</a:t>
+            </a:r>
+            <a:r>
+              <a:rPr lang="da-DK" sz="1200" dirty="0">
+                <a:solidFill>
+                  <a:srgbClr val="000000"/>
+                </a:solidFill>
+                <a:latin typeface="Cascadia Mono" panose="020B0609020000020004" pitchFamily="49" charset="0"/>
+              </a:rPr>
+              <a:t> _</a:t>
+            </a:r>
+            <a:r>
+              <a:rPr lang="da-DK" sz="1200" dirty="0" err="1">
+                <a:solidFill>
+                  <a:srgbClr val="000000"/>
+                </a:solidFill>
+                <a:latin typeface="Cascadia Mono" panose="020B0609020000020004" pitchFamily="49" charset="0"/>
+              </a:rPr>
+              <a:t>waterLevelHighAutoResetEvent</a:t>
+            </a:r>
+            <a:r>
+              <a:rPr lang="da-DK" sz="1200" dirty="0">
+                <a:solidFill>
+                  <a:srgbClr val="000000"/>
+                </a:solidFill>
+                <a:latin typeface="Cascadia Mono" panose="020B0609020000020004" pitchFamily="49" charset="0"/>
+              </a:rPr>
+              <a:t> = </a:t>
+            </a:r>
+            <a:r>
+              <a:rPr lang="da-DK" sz="1200" dirty="0" smtClean="0">
+                <a:solidFill>
+                  <a:srgbClr val="0000FF"/>
+                </a:solidFill>
+                <a:latin typeface="Cascadia Mono" panose="020B0609020000020004" pitchFamily="49" charset="0"/>
+              </a:rPr>
+              <a:t>new</a:t>
+            </a:r>
+            <a:r>
+              <a:rPr lang="da-DK" sz="1200" dirty="0" smtClean="0">
+                <a:solidFill>
+                  <a:srgbClr val="000000"/>
+                </a:solidFill>
+                <a:latin typeface="Cascadia Mono" panose="020B0609020000020004" pitchFamily="49" charset="0"/>
+              </a:rPr>
+              <a:t> </a:t>
+            </a:r>
+            <a:r>
+              <a:rPr lang="da-DK" sz="1200" dirty="0" err="1">
+                <a:solidFill>
+                  <a:srgbClr val="000000"/>
+                </a:solidFill>
+                <a:latin typeface="Cascadia Mono" panose="020B0609020000020004" pitchFamily="49" charset="0"/>
+              </a:rPr>
+              <a:t>AutoResetEvent</a:t>
+            </a:r>
+            <a:r>
+              <a:rPr lang="da-DK" sz="1200" dirty="0">
+                <a:solidFill>
+                  <a:srgbClr val="000000"/>
+                </a:solidFill>
+                <a:latin typeface="Cascadia Mono" panose="020B0609020000020004" pitchFamily="49" charset="0"/>
+              </a:rPr>
+              <a:t>(</a:t>
+            </a:r>
+            <a:r>
+              <a:rPr lang="da-DK" sz="1200" dirty="0">
+                <a:solidFill>
+                  <a:srgbClr val="0000FF"/>
+                </a:solidFill>
+                <a:latin typeface="Cascadia Mono" panose="020B0609020000020004" pitchFamily="49" charset="0"/>
+              </a:rPr>
+              <a:t>false</a:t>
+            </a:r>
+            <a:r>
+              <a:rPr lang="da-DK" sz="1200" dirty="0">
+                <a:solidFill>
+                  <a:srgbClr val="000000"/>
+                </a:solidFill>
+                <a:latin typeface="Cascadia Mono" panose="020B0609020000020004" pitchFamily="49" charset="0"/>
+              </a:rPr>
+              <a:t>);</a:t>
+            </a:r>
+          </a:p>
+          <a:p>
+            <a:r>
+              <a:rPr lang="da-DK" sz="1200" dirty="0">
+                <a:solidFill>
+                  <a:srgbClr val="000000"/>
+                </a:solidFill>
+                <a:latin typeface="Cascadia Mono" panose="020B0609020000020004" pitchFamily="49" charset="0"/>
+              </a:rPr>
+              <a:t>    </a:t>
+            </a:r>
+            <a:r>
+              <a:rPr lang="da-DK" sz="1200" dirty="0">
+                <a:solidFill>
+                  <a:srgbClr val="0000FF"/>
+                </a:solidFill>
+                <a:latin typeface="Cascadia Mono" panose="020B0609020000020004" pitchFamily="49" charset="0"/>
+              </a:rPr>
+              <a:t>private</a:t>
+            </a:r>
+            <a:r>
+              <a:rPr lang="da-DK" sz="1200" dirty="0">
+                <a:solidFill>
+                  <a:srgbClr val="000000"/>
+                </a:solidFill>
+                <a:latin typeface="Cascadia Mono" panose="020B0609020000020004" pitchFamily="49" charset="0"/>
+              </a:rPr>
+              <a:t> </a:t>
+            </a:r>
+            <a:r>
+              <a:rPr lang="da-DK" sz="1200" dirty="0" err="1">
+                <a:solidFill>
+                  <a:srgbClr val="0000FF"/>
+                </a:solidFill>
+                <a:latin typeface="Cascadia Mono" panose="020B0609020000020004" pitchFamily="49" charset="0"/>
+              </a:rPr>
+              <a:t>int</a:t>
+            </a:r>
+            <a:r>
+              <a:rPr lang="da-DK" sz="1200" dirty="0">
+                <a:solidFill>
+                  <a:srgbClr val="000000"/>
+                </a:solidFill>
+                <a:latin typeface="Cascadia Mono" panose="020B0609020000020004" pitchFamily="49" charset="0"/>
+              </a:rPr>
+              <a:t> _</a:t>
+            </a:r>
+            <a:r>
+              <a:rPr lang="da-DK" sz="1200" dirty="0" err="1">
+                <a:solidFill>
+                  <a:srgbClr val="000000"/>
+                </a:solidFill>
+                <a:latin typeface="Cascadia Mono" panose="020B0609020000020004" pitchFamily="49" charset="0"/>
+              </a:rPr>
+              <a:t>waterLevel</a:t>
+            </a:r>
+            <a:r>
+              <a:rPr lang="da-DK" sz="1200" dirty="0">
+                <a:solidFill>
+                  <a:srgbClr val="000000"/>
+                </a:solidFill>
+                <a:latin typeface="Cascadia Mono" panose="020B0609020000020004" pitchFamily="49" charset="0"/>
+              </a:rPr>
+              <a:t>;</a:t>
+            </a:r>
+          </a:p>
+          <a:p>
+            <a:r>
+              <a:rPr lang="en-US" sz="1200" dirty="0">
+                <a:solidFill>
+                  <a:srgbClr val="000000"/>
+                </a:solidFill>
+                <a:latin typeface="Cascadia Mono" panose="020B0609020000020004" pitchFamily="49" charset="0"/>
+              </a:rPr>
+              <a:t>    </a:t>
+            </a:r>
+            <a:r>
+              <a:rPr lang="en-US" sz="1200" dirty="0">
+                <a:solidFill>
+                  <a:srgbClr val="0000FF"/>
+                </a:solidFill>
+                <a:latin typeface="Cascadia Mono" panose="020B0609020000020004" pitchFamily="49" charset="0"/>
+              </a:rPr>
+              <a:t>private</a:t>
+            </a:r>
+            <a:r>
+              <a:rPr lang="en-US" sz="1200" dirty="0">
+                <a:solidFill>
+                  <a:srgbClr val="000000"/>
+                </a:solidFill>
+                <a:latin typeface="Cascadia Mono" panose="020B0609020000020004" pitchFamily="49" charset="0"/>
+              </a:rPr>
+              <a:t> </a:t>
+            </a:r>
+            <a:r>
+              <a:rPr lang="en-US" sz="1200" dirty="0" err="1">
+                <a:solidFill>
+                  <a:srgbClr val="0000FF"/>
+                </a:solidFill>
+                <a:latin typeface="Cascadia Mono" panose="020B0609020000020004" pitchFamily="49" charset="0"/>
+              </a:rPr>
+              <a:t>readonly</a:t>
+            </a:r>
+            <a:r>
+              <a:rPr lang="en-US" sz="1200" dirty="0">
+                <a:solidFill>
+                  <a:srgbClr val="000000"/>
+                </a:solidFill>
+                <a:latin typeface="Cascadia Mono" panose="020B0609020000020004" pitchFamily="49" charset="0"/>
+              </a:rPr>
+              <a:t> </a:t>
+            </a:r>
+            <a:r>
+              <a:rPr lang="en-US" sz="1200" dirty="0">
+                <a:solidFill>
+                  <a:srgbClr val="0000FF"/>
+                </a:solidFill>
+                <a:latin typeface="Cascadia Mono" panose="020B0609020000020004" pitchFamily="49" charset="0"/>
+              </a:rPr>
+              <a:t>object</a:t>
+            </a:r>
+            <a:r>
+              <a:rPr lang="en-US" sz="1200" dirty="0">
+                <a:solidFill>
+                  <a:srgbClr val="000000"/>
+                </a:solidFill>
+                <a:latin typeface="Cascadia Mono" panose="020B0609020000020004" pitchFamily="49" charset="0"/>
+              </a:rPr>
+              <a:t> _</a:t>
+            </a:r>
+            <a:r>
+              <a:rPr lang="en-US" sz="1200" dirty="0" err="1">
+                <a:solidFill>
+                  <a:srgbClr val="000000"/>
+                </a:solidFill>
+                <a:latin typeface="Cascadia Mono" panose="020B0609020000020004" pitchFamily="49" charset="0"/>
+              </a:rPr>
+              <a:t>waterLevelLockObject</a:t>
+            </a:r>
+            <a:r>
+              <a:rPr lang="en-US" sz="1200" dirty="0">
+                <a:solidFill>
+                  <a:srgbClr val="000000"/>
+                </a:solidFill>
+                <a:latin typeface="Cascadia Mono" panose="020B0609020000020004" pitchFamily="49" charset="0"/>
+              </a:rPr>
+              <a:t> = </a:t>
+            </a:r>
+            <a:endParaRPr lang="en-US" sz="1200" dirty="0" smtClean="0">
+              <a:solidFill>
+                <a:srgbClr val="000000"/>
+              </a:solidFill>
+              <a:latin typeface="Cascadia Mono" panose="020B0609020000020004" pitchFamily="49" charset="0"/>
+            </a:endParaRPr>
+          </a:p>
+          <a:p>
+            <a:r>
+              <a:rPr lang="en-US" sz="1200" dirty="0">
+                <a:solidFill>
+                  <a:srgbClr val="000000"/>
+                </a:solidFill>
+                <a:latin typeface="Cascadia Mono" panose="020B0609020000020004" pitchFamily="49" charset="0"/>
+              </a:rPr>
+              <a:t> </a:t>
+            </a:r>
+            <a:r>
+              <a:rPr lang="en-US" sz="1200" dirty="0" smtClean="0">
+                <a:solidFill>
+                  <a:srgbClr val="000000"/>
+                </a:solidFill>
+                <a:latin typeface="Cascadia Mono" panose="020B0609020000020004" pitchFamily="49" charset="0"/>
+              </a:rPr>
+              <a:t>       </a:t>
+            </a:r>
+            <a:r>
+              <a:rPr lang="en-US" sz="1200" dirty="0" smtClean="0">
+                <a:solidFill>
+                  <a:srgbClr val="0000FF"/>
+                </a:solidFill>
+                <a:latin typeface="Cascadia Mono" panose="020B0609020000020004" pitchFamily="49" charset="0"/>
+              </a:rPr>
+              <a:t>new</a:t>
+            </a:r>
+            <a:r>
+              <a:rPr lang="en-US" sz="1200" dirty="0" smtClean="0">
+                <a:solidFill>
+                  <a:srgbClr val="000000"/>
+                </a:solidFill>
+                <a:latin typeface="Cascadia Mono" panose="020B0609020000020004" pitchFamily="49" charset="0"/>
+              </a:rPr>
+              <a:t> </a:t>
+            </a:r>
+            <a:r>
+              <a:rPr lang="en-US" sz="1200" dirty="0">
+                <a:solidFill>
+                  <a:srgbClr val="0000FF"/>
+                </a:solidFill>
+                <a:latin typeface="Cascadia Mono" panose="020B0609020000020004" pitchFamily="49" charset="0"/>
+              </a:rPr>
+              <a:t>object</a:t>
+            </a:r>
+            <a:r>
+              <a:rPr lang="en-US" sz="1200" dirty="0">
+                <a:solidFill>
+                  <a:srgbClr val="000000"/>
+                </a:solidFill>
+                <a:latin typeface="Cascadia Mono" panose="020B0609020000020004" pitchFamily="49" charset="0"/>
+              </a:rPr>
+              <a:t>();</a:t>
+            </a:r>
+          </a:p>
+          <a:p>
+            <a:endParaRPr lang="da-DK" sz="1200" dirty="0">
+              <a:solidFill>
+                <a:srgbClr val="000000"/>
+              </a:solidFill>
+              <a:latin typeface="Cascadia Mono" panose="020B0609020000020004" pitchFamily="49" charset="0"/>
+            </a:endParaRPr>
+          </a:p>
+          <a:p>
+            <a:r>
+              <a:rPr lang="da-DK" sz="1200" dirty="0">
+                <a:solidFill>
+                  <a:srgbClr val="000000"/>
+                </a:solidFill>
+                <a:latin typeface="Cascadia Mono" panose="020B0609020000020004" pitchFamily="49" charset="0"/>
+              </a:rPr>
+              <a:t>    </a:t>
+            </a:r>
+            <a:r>
+              <a:rPr lang="da-DK" sz="1200" dirty="0">
+                <a:solidFill>
+                  <a:srgbClr val="0000FF"/>
+                </a:solidFill>
+                <a:latin typeface="Cascadia Mono" panose="020B0609020000020004" pitchFamily="49" charset="0"/>
+              </a:rPr>
+              <a:t>public</a:t>
+            </a:r>
+            <a:r>
+              <a:rPr lang="da-DK" sz="1200" dirty="0">
+                <a:solidFill>
+                  <a:srgbClr val="000000"/>
+                </a:solidFill>
+                <a:latin typeface="Cascadia Mono" panose="020B0609020000020004" pitchFamily="49" charset="0"/>
+              </a:rPr>
+              <a:t> </a:t>
+            </a:r>
+            <a:r>
+              <a:rPr lang="da-DK" sz="1200" dirty="0" err="1">
+                <a:solidFill>
+                  <a:srgbClr val="2B91AF"/>
+                </a:solidFill>
+                <a:latin typeface="Cascadia Mono" panose="020B0609020000020004" pitchFamily="49" charset="0"/>
+              </a:rPr>
+              <a:t>PumpController</a:t>
+            </a:r>
+            <a:r>
+              <a:rPr lang="da-DK" sz="1200" dirty="0">
+                <a:solidFill>
+                  <a:srgbClr val="000000"/>
+                </a:solidFill>
+                <a:latin typeface="Cascadia Mono" panose="020B0609020000020004" pitchFamily="49" charset="0"/>
+              </a:rPr>
+              <a:t>(</a:t>
+            </a:r>
+            <a:r>
+              <a:rPr lang="da-DK" sz="1200" dirty="0" err="1">
+                <a:solidFill>
+                  <a:srgbClr val="000000"/>
+                </a:solidFill>
+                <a:latin typeface="Cascadia Mono" panose="020B0609020000020004" pitchFamily="49" charset="0"/>
+              </a:rPr>
+              <a:t>WaterLevelSubject</a:t>
+            </a:r>
+            <a:r>
+              <a:rPr lang="da-DK" sz="1200" dirty="0">
+                <a:solidFill>
+                  <a:srgbClr val="000000"/>
+                </a:solidFill>
+                <a:latin typeface="Cascadia Mono" panose="020B0609020000020004" pitchFamily="49" charset="0"/>
+              </a:rPr>
+              <a:t> </a:t>
+            </a:r>
+            <a:r>
+              <a:rPr lang="da-DK" sz="1200" dirty="0" err="1">
+                <a:solidFill>
+                  <a:srgbClr val="000000"/>
+                </a:solidFill>
+                <a:latin typeface="Cascadia Mono" panose="020B0609020000020004" pitchFamily="49" charset="0"/>
+              </a:rPr>
+              <a:t>subject</a:t>
+            </a:r>
+            <a:r>
+              <a:rPr lang="da-DK" sz="1200" dirty="0">
+                <a:solidFill>
+                  <a:srgbClr val="000000"/>
+                </a:solidFill>
+                <a:latin typeface="Cascadia Mono" panose="020B0609020000020004" pitchFamily="49" charset="0"/>
+              </a:rPr>
+              <a:t>)</a:t>
+            </a:r>
+          </a:p>
+          <a:p>
+            <a:r>
+              <a:rPr lang="da-DK" sz="1200" dirty="0">
+                <a:solidFill>
+                  <a:srgbClr val="000000"/>
+                </a:solidFill>
+                <a:latin typeface="Cascadia Mono" panose="020B0609020000020004" pitchFamily="49" charset="0"/>
+              </a:rPr>
+              <a:t>    {</a:t>
+            </a:r>
+          </a:p>
+          <a:p>
+            <a:r>
+              <a:rPr lang="da-DK" sz="1200" dirty="0">
+                <a:solidFill>
+                  <a:srgbClr val="000000"/>
+                </a:solidFill>
+                <a:latin typeface="Cascadia Mono" panose="020B0609020000020004" pitchFamily="49" charset="0"/>
+              </a:rPr>
+              <a:t>        </a:t>
+            </a:r>
+            <a:r>
+              <a:rPr lang="da-DK" sz="1200" dirty="0" err="1">
+                <a:solidFill>
+                  <a:srgbClr val="000000"/>
+                </a:solidFill>
+                <a:latin typeface="Cascadia Mono" panose="020B0609020000020004" pitchFamily="49" charset="0"/>
+              </a:rPr>
+              <a:t>subject.Attach</a:t>
+            </a:r>
+            <a:r>
+              <a:rPr lang="da-DK" sz="1200" dirty="0">
+                <a:solidFill>
+                  <a:srgbClr val="000000"/>
+                </a:solidFill>
+                <a:latin typeface="Cascadia Mono" panose="020B0609020000020004" pitchFamily="49" charset="0"/>
+              </a:rPr>
+              <a:t>(</a:t>
+            </a:r>
+            <a:r>
+              <a:rPr lang="da-DK" sz="1200" dirty="0" err="1">
+                <a:solidFill>
+                  <a:srgbClr val="0000FF"/>
+                </a:solidFill>
+                <a:latin typeface="Cascadia Mono" panose="020B0609020000020004" pitchFamily="49" charset="0"/>
+              </a:rPr>
+              <a:t>this</a:t>
+            </a:r>
+            <a:r>
+              <a:rPr lang="da-DK" sz="1200" dirty="0">
+                <a:solidFill>
+                  <a:srgbClr val="000000"/>
+                </a:solidFill>
+                <a:latin typeface="Cascadia Mono" panose="020B0609020000020004" pitchFamily="49" charset="0"/>
+              </a:rPr>
+              <a:t>);</a:t>
+            </a:r>
+          </a:p>
+          <a:p>
+            <a:r>
+              <a:rPr lang="da-DK" sz="1200" dirty="0">
+                <a:solidFill>
+                  <a:srgbClr val="000000"/>
+                </a:solidFill>
+                <a:latin typeface="Cascadia Mono" panose="020B0609020000020004" pitchFamily="49" charset="0"/>
+              </a:rPr>
+              <a:t>    }</a:t>
+            </a:r>
+          </a:p>
+          <a:p>
+            <a:endParaRPr lang="da-DK" sz="1200" dirty="0">
+              <a:solidFill>
+                <a:srgbClr val="000000"/>
+              </a:solidFill>
+              <a:latin typeface="Cascadia Mono" panose="020B0609020000020004" pitchFamily="49" charset="0"/>
+            </a:endParaRPr>
+          </a:p>
+          <a:p>
+            <a:r>
+              <a:rPr lang="da-DK" sz="1200" dirty="0">
+                <a:solidFill>
+                  <a:srgbClr val="000000"/>
+                </a:solidFill>
+                <a:latin typeface="Cascadia Mono" panose="020B0609020000020004" pitchFamily="49" charset="0"/>
+              </a:rPr>
+              <a:t>    </a:t>
+            </a:r>
+            <a:r>
+              <a:rPr lang="da-DK" sz="1200" dirty="0">
+                <a:solidFill>
+                  <a:srgbClr val="0000FF"/>
+                </a:solidFill>
+                <a:latin typeface="Cascadia Mono" panose="020B0609020000020004" pitchFamily="49" charset="0"/>
+              </a:rPr>
+              <a:t>public</a:t>
+            </a:r>
+            <a:r>
+              <a:rPr lang="da-DK" sz="1200" dirty="0">
+                <a:solidFill>
+                  <a:srgbClr val="000000"/>
+                </a:solidFill>
+                <a:latin typeface="Cascadia Mono" panose="020B0609020000020004" pitchFamily="49" charset="0"/>
+              </a:rPr>
+              <a:t> </a:t>
+            </a:r>
+            <a:r>
+              <a:rPr lang="da-DK" sz="1200" dirty="0" err="1">
+                <a:solidFill>
+                  <a:srgbClr val="0000FF"/>
+                </a:solidFill>
+                <a:latin typeface="Cascadia Mono" panose="020B0609020000020004" pitchFamily="49" charset="0"/>
+              </a:rPr>
+              <a:t>void</a:t>
+            </a:r>
+            <a:r>
+              <a:rPr lang="da-DK" sz="1200" dirty="0">
+                <a:solidFill>
+                  <a:srgbClr val="000000"/>
+                </a:solidFill>
+                <a:latin typeface="Cascadia Mono" panose="020B0609020000020004" pitchFamily="49" charset="0"/>
+              </a:rPr>
+              <a:t> Update(</a:t>
+            </a:r>
+            <a:r>
+              <a:rPr lang="da-DK" sz="1200" dirty="0" err="1">
+                <a:solidFill>
+                  <a:srgbClr val="0000FF"/>
+                </a:solidFill>
+                <a:latin typeface="Cascadia Mono" panose="020B0609020000020004" pitchFamily="49" charset="0"/>
+              </a:rPr>
+              <a:t>int</a:t>
+            </a:r>
+            <a:r>
+              <a:rPr lang="da-DK" sz="1200" dirty="0">
+                <a:solidFill>
+                  <a:srgbClr val="000000"/>
+                </a:solidFill>
+                <a:latin typeface="Cascadia Mono" panose="020B0609020000020004" pitchFamily="49" charset="0"/>
+              </a:rPr>
+              <a:t> </a:t>
+            </a:r>
+            <a:r>
+              <a:rPr lang="da-DK" sz="1200" dirty="0" err="1">
+                <a:solidFill>
+                  <a:srgbClr val="000000"/>
+                </a:solidFill>
+                <a:latin typeface="Cascadia Mono" panose="020B0609020000020004" pitchFamily="49" charset="0"/>
+              </a:rPr>
+              <a:t>waterLevel</a:t>
+            </a:r>
+            <a:r>
+              <a:rPr lang="da-DK" sz="1200" dirty="0">
+                <a:solidFill>
+                  <a:srgbClr val="000000"/>
+                </a:solidFill>
+                <a:latin typeface="Cascadia Mono" panose="020B0609020000020004" pitchFamily="49" charset="0"/>
+              </a:rPr>
+              <a:t>)</a:t>
+            </a:r>
+          </a:p>
+          <a:p>
+            <a:r>
+              <a:rPr lang="da-DK" sz="1200" dirty="0">
+                <a:solidFill>
+                  <a:srgbClr val="000000"/>
+                </a:solidFill>
+                <a:latin typeface="Cascadia Mono" panose="020B0609020000020004" pitchFamily="49" charset="0"/>
+              </a:rPr>
+              <a:t>    {</a:t>
+            </a:r>
+          </a:p>
+          <a:p>
+            <a:r>
+              <a:rPr lang="da-DK" sz="1200" dirty="0">
+                <a:solidFill>
+                  <a:srgbClr val="000000"/>
+                </a:solidFill>
+                <a:latin typeface="Cascadia Mono" panose="020B0609020000020004" pitchFamily="49" charset="0"/>
+              </a:rPr>
+              <a:t>        </a:t>
+            </a:r>
+            <a:r>
+              <a:rPr lang="da-DK" sz="1200" dirty="0" err="1">
+                <a:solidFill>
+                  <a:srgbClr val="000000"/>
+                </a:solidFill>
+                <a:latin typeface="Cascadia Mono" panose="020B0609020000020004" pitchFamily="49" charset="0"/>
+              </a:rPr>
+              <a:t>WaterLevel</a:t>
+            </a:r>
+            <a:r>
+              <a:rPr lang="da-DK" sz="1200" dirty="0">
+                <a:solidFill>
+                  <a:srgbClr val="000000"/>
+                </a:solidFill>
+                <a:latin typeface="Cascadia Mono" panose="020B0609020000020004" pitchFamily="49" charset="0"/>
+              </a:rPr>
+              <a:t> = </a:t>
+            </a:r>
+            <a:r>
+              <a:rPr lang="da-DK" sz="1200" dirty="0" err="1">
+                <a:solidFill>
+                  <a:srgbClr val="000000"/>
+                </a:solidFill>
+                <a:latin typeface="Cascadia Mono" panose="020B0609020000020004" pitchFamily="49" charset="0"/>
+              </a:rPr>
+              <a:t>waterLevel</a:t>
+            </a:r>
+            <a:r>
+              <a:rPr lang="da-DK" sz="1200" dirty="0">
+                <a:solidFill>
+                  <a:srgbClr val="000000"/>
+                </a:solidFill>
+                <a:latin typeface="Cascadia Mono" panose="020B0609020000020004" pitchFamily="49" charset="0"/>
+              </a:rPr>
+              <a:t>;</a:t>
+            </a:r>
+          </a:p>
+          <a:p>
+            <a:r>
+              <a:rPr lang="da-DK" sz="1200" dirty="0">
+                <a:solidFill>
+                  <a:srgbClr val="000000"/>
+                </a:solidFill>
+                <a:latin typeface="Cascadia Mono" panose="020B0609020000020004" pitchFamily="49" charset="0"/>
+              </a:rPr>
+              <a:t>        _</a:t>
+            </a:r>
+            <a:r>
+              <a:rPr lang="da-DK" sz="1200" dirty="0" err="1">
+                <a:solidFill>
+                  <a:srgbClr val="000000"/>
+                </a:solidFill>
+                <a:latin typeface="Cascadia Mono" panose="020B0609020000020004" pitchFamily="49" charset="0"/>
+              </a:rPr>
+              <a:t>waterLevelHighAutoResetEvent.Set</a:t>
+            </a:r>
+            <a:r>
+              <a:rPr lang="da-DK" sz="1200" dirty="0">
+                <a:solidFill>
+                  <a:srgbClr val="000000"/>
+                </a:solidFill>
+                <a:latin typeface="Cascadia Mono" panose="020B0609020000020004" pitchFamily="49" charset="0"/>
+              </a:rPr>
+              <a:t>();</a:t>
+            </a:r>
+          </a:p>
+          <a:p>
+            <a:r>
+              <a:rPr lang="da-DK" sz="1200" dirty="0">
+                <a:solidFill>
+                  <a:srgbClr val="000000"/>
+                </a:solidFill>
+                <a:latin typeface="Cascadia Mono" panose="020B0609020000020004" pitchFamily="49" charset="0"/>
+              </a:rPr>
+              <a:t>    }</a:t>
+            </a:r>
+          </a:p>
+        </p:txBody>
+      </p:sp>
+      <p:sp>
+        <p:nvSpPr>
+          <p:cNvPr id="7" name="Rectangle 6"/>
+          <p:cNvSpPr/>
+          <p:nvPr/>
+        </p:nvSpPr>
+        <p:spPr>
+          <a:xfrm>
+            <a:off x="5928804" y="1311965"/>
+            <a:ext cx="6019356" cy="5400120"/>
+          </a:xfrm>
+          <a:prstGeom prst="rect">
+            <a:avLst/>
+          </a:prstGeom>
+          <a:solidFill>
+            <a:schemeClr val="bg2"/>
+          </a:solidFill>
+        </p:spPr>
+        <p:style>
+          <a:lnRef idx="2">
+            <a:schemeClr val="accent1">
+              <a:shade val="50000"/>
+            </a:schemeClr>
+          </a:lnRef>
+          <a:fillRef idx="1">
+            <a:schemeClr val="accent1"/>
+          </a:fillRef>
+          <a:effectRef idx="0">
+            <a:schemeClr val="accent1"/>
+          </a:effectRef>
+          <a:fontRef idx="minor">
+            <a:schemeClr val="lt1"/>
+          </a:fontRef>
+        </p:style>
+        <p:txBody>
+          <a:bodyPr rtlCol="0" anchor="ctr"/>
+          <a:lstStyle/>
+          <a:p>
+            <a:r>
+              <a:rPr lang="da-DK" sz="1200" dirty="0" smtClean="0">
+                <a:solidFill>
+                  <a:srgbClr val="0000FF"/>
+                </a:solidFill>
+                <a:latin typeface="Cascadia Mono" panose="020B0609020000020004" pitchFamily="49" charset="0"/>
+              </a:rPr>
+              <a:t>public</a:t>
+            </a:r>
+            <a:r>
+              <a:rPr lang="da-DK" sz="1200" dirty="0" smtClean="0">
+                <a:solidFill>
+                  <a:srgbClr val="000000"/>
+                </a:solidFill>
+                <a:latin typeface="Cascadia Mono" panose="020B0609020000020004" pitchFamily="49" charset="0"/>
+              </a:rPr>
+              <a:t> </a:t>
+            </a:r>
+            <a:r>
+              <a:rPr lang="da-DK" sz="1200" dirty="0" err="1">
+                <a:solidFill>
+                  <a:srgbClr val="0000FF"/>
+                </a:solidFill>
+                <a:latin typeface="Cascadia Mono" panose="020B0609020000020004" pitchFamily="49" charset="0"/>
+              </a:rPr>
+              <a:t>void</a:t>
+            </a:r>
+            <a:r>
+              <a:rPr lang="da-DK" sz="1200" dirty="0">
+                <a:solidFill>
+                  <a:srgbClr val="000000"/>
+                </a:solidFill>
+                <a:latin typeface="Cascadia Mono" panose="020B0609020000020004" pitchFamily="49" charset="0"/>
+              </a:rPr>
+              <a:t> Run()</a:t>
+            </a:r>
+          </a:p>
+          <a:p>
+            <a:r>
+              <a:rPr lang="da-DK" sz="1200" dirty="0" smtClean="0">
+                <a:solidFill>
+                  <a:srgbClr val="000000"/>
+                </a:solidFill>
+                <a:latin typeface="Cascadia Mono" panose="020B0609020000020004" pitchFamily="49" charset="0"/>
+              </a:rPr>
+              <a:t>{</a:t>
+            </a:r>
+            <a:endParaRPr lang="da-DK" sz="1200" dirty="0">
+              <a:solidFill>
+                <a:srgbClr val="000000"/>
+              </a:solidFill>
+              <a:latin typeface="Cascadia Mono" panose="020B0609020000020004" pitchFamily="49" charset="0"/>
+            </a:endParaRPr>
+          </a:p>
+          <a:p>
+            <a:r>
+              <a:rPr lang="da-DK" sz="1200" dirty="0" smtClean="0">
+                <a:solidFill>
+                  <a:srgbClr val="000000"/>
+                </a:solidFill>
+                <a:latin typeface="Cascadia Mono" panose="020B0609020000020004" pitchFamily="49" charset="0"/>
+              </a:rPr>
+              <a:t>  </a:t>
+            </a:r>
+            <a:r>
+              <a:rPr lang="da-DK" sz="1200" dirty="0" err="1">
+                <a:solidFill>
+                  <a:srgbClr val="0000FF"/>
+                </a:solidFill>
+                <a:latin typeface="Cascadia Mono" panose="020B0609020000020004" pitchFamily="49" charset="0"/>
+              </a:rPr>
+              <a:t>while</a:t>
+            </a:r>
+            <a:r>
+              <a:rPr lang="da-DK" sz="1200" dirty="0">
+                <a:solidFill>
+                  <a:srgbClr val="000000"/>
+                </a:solidFill>
+                <a:latin typeface="Cascadia Mono" panose="020B0609020000020004" pitchFamily="49" charset="0"/>
+              </a:rPr>
+              <a:t> (!</a:t>
+            </a:r>
+            <a:r>
+              <a:rPr lang="da-DK" sz="1200" dirty="0" err="1">
+                <a:solidFill>
+                  <a:srgbClr val="000000"/>
+                </a:solidFill>
+                <a:latin typeface="Cascadia Mono" panose="020B0609020000020004" pitchFamily="49" charset="0"/>
+              </a:rPr>
+              <a:t>ShallStop</a:t>
+            </a:r>
+            <a:r>
+              <a:rPr lang="da-DK" sz="1200" dirty="0">
+                <a:solidFill>
+                  <a:srgbClr val="000000"/>
+                </a:solidFill>
+                <a:latin typeface="Cascadia Mono" panose="020B0609020000020004" pitchFamily="49" charset="0"/>
+              </a:rPr>
+              <a:t>)</a:t>
+            </a:r>
+          </a:p>
+          <a:p>
+            <a:r>
+              <a:rPr lang="da-DK" sz="1200" dirty="0" smtClean="0">
+                <a:solidFill>
+                  <a:srgbClr val="000000"/>
+                </a:solidFill>
+                <a:latin typeface="Cascadia Mono" panose="020B0609020000020004" pitchFamily="49" charset="0"/>
+              </a:rPr>
+              <a:t>  </a:t>
+            </a:r>
+            <a:r>
+              <a:rPr lang="da-DK" sz="1200" dirty="0">
+                <a:solidFill>
+                  <a:srgbClr val="000000"/>
+                </a:solidFill>
+                <a:latin typeface="Cascadia Mono" panose="020B0609020000020004" pitchFamily="49" charset="0"/>
+              </a:rPr>
+              <a:t>{</a:t>
+            </a:r>
+          </a:p>
+          <a:p>
+            <a:r>
+              <a:rPr lang="da-DK" sz="1200" dirty="0" smtClean="0">
+                <a:solidFill>
+                  <a:srgbClr val="000000"/>
+                </a:solidFill>
+                <a:latin typeface="Cascadia Mono" panose="020B0609020000020004" pitchFamily="49" charset="0"/>
+              </a:rPr>
+              <a:t>      </a:t>
+            </a:r>
+            <a:r>
+              <a:rPr lang="da-DK" sz="1200" dirty="0" err="1">
+                <a:solidFill>
+                  <a:srgbClr val="0000FF"/>
+                </a:solidFill>
+                <a:latin typeface="Cascadia Mono" panose="020B0609020000020004" pitchFamily="49" charset="0"/>
+              </a:rPr>
+              <a:t>bool</a:t>
+            </a:r>
+            <a:r>
+              <a:rPr lang="da-DK" sz="1200" dirty="0">
+                <a:solidFill>
+                  <a:srgbClr val="000000"/>
+                </a:solidFill>
+                <a:latin typeface="Cascadia Mono" panose="020B0609020000020004" pitchFamily="49" charset="0"/>
+              </a:rPr>
+              <a:t> </a:t>
+            </a:r>
+            <a:r>
+              <a:rPr lang="da-DK" sz="1200" dirty="0" err="1">
+                <a:solidFill>
+                  <a:srgbClr val="000000"/>
+                </a:solidFill>
+                <a:latin typeface="Cascadia Mono" panose="020B0609020000020004" pitchFamily="49" charset="0"/>
+              </a:rPr>
+              <a:t>wasSet</a:t>
+            </a:r>
+            <a:r>
+              <a:rPr lang="da-DK" sz="1200" dirty="0">
+                <a:solidFill>
+                  <a:srgbClr val="000000"/>
+                </a:solidFill>
+                <a:latin typeface="Cascadia Mono" panose="020B0609020000020004" pitchFamily="49" charset="0"/>
+              </a:rPr>
+              <a:t> = </a:t>
+            </a:r>
+            <a:r>
+              <a:rPr lang="da-DK" sz="1200" dirty="0" smtClean="0">
+                <a:solidFill>
+                  <a:srgbClr val="000000"/>
+                </a:solidFill>
+                <a:latin typeface="Cascadia Mono" panose="020B0609020000020004" pitchFamily="49" charset="0"/>
+              </a:rPr>
+              <a:t>_</a:t>
+            </a:r>
+            <a:r>
+              <a:rPr lang="da-DK" sz="1200" dirty="0" err="1" smtClean="0">
+                <a:solidFill>
+                  <a:srgbClr val="000000"/>
+                </a:solidFill>
+                <a:latin typeface="Cascadia Mono" panose="020B0609020000020004" pitchFamily="49" charset="0"/>
+              </a:rPr>
+              <a:t>waterLevelHighAutoResetEvent.WaitOne</a:t>
+            </a:r>
+            <a:r>
+              <a:rPr lang="da-DK" sz="1200" dirty="0" smtClean="0">
+                <a:solidFill>
+                  <a:srgbClr val="000000"/>
+                </a:solidFill>
+                <a:latin typeface="Cascadia Mono" panose="020B0609020000020004" pitchFamily="49" charset="0"/>
+              </a:rPr>
+              <a:t>(5000</a:t>
+            </a:r>
+            <a:r>
+              <a:rPr lang="da-DK" sz="1200" dirty="0">
+                <a:solidFill>
+                  <a:srgbClr val="000000"/>
+                </a:solidFill>
+                <a:latin typeface="Cascadia Mono" panose="020B0609020000020004" pitchFamily="49" charset="0"/>
+              </a:rPr>
+              <a:t>);</a:t>
+            </a:r>
+          </a:p>
+          <a:p>
+            <a:r>
+              <a:rPr lang="da-DK" sz="1200" dirty="0" smtClean="0">
+                <a:solidFill>
+                  <a:srgbClr val="000000"/>
+                </a:solidFill>
+                <a:latin typeface="Cascadia Mono" panose="020B0609020000020004" pitchFamily="49" charset="0"/>
+              </a:rPr>
+              <a:t>      </a:t>
+            </a:r>
+            <a:r>
+              <a:rPr lang="da-DK" sz="1200" dirty="0">
+                <a:solidFill>
+                  <a:srgbClr val="0000FF"/>
+                </a:solidFill>
+                <a:latin typeface="Cascadia Mono" panose="020B0609020000020004" pitchFamily="49" charset="0"/>
+              </a:rPr>
+              <a:t>if</a:t>
+            </a:r>
+            <a:r>
+              <a:rPr lang="da-DK" sz="1200" dirty="0">
+                <a:solidFill>
+                  <a:srgbClr val="000000"/>
+                </a:solidFill>
+                <a:latin typeface="Cascadia Mono" panose="020B0609020000020004" pitchFamily="49" charset="0"/>
+              </a:rPr>
+              <a:t> (</a:t>
+            </a:r>
+            <a:r>
+              <a:rPr lang="da-DK" sz="1200" dirty="0" err="1">
+                <a:solidFill>
+                  <a:srgbClr val="000000"/>
+                </a:solidFill>
+                <a:latin typeface="Cascadia Mono" panose="020B0609020000020004" pitchFamily="49" charset="0"/>
+              </a:rPr>
+              <a:t>wasSet</a:t>
+            </a:r>
+            <a:r>
+              <a:rPr lang="da-DK" sz="1200" dirty="0">
+                <a:solidFill>
+                  <a:srgbClr val="000000"/>
+                </a:solidFill>
+                <a:latin typeface="Cascadia Mono" panose="020B0609020000020004" pitchFamily="49" charset="0"/>
+              </a:rPr>
+              <a:t>)</a:t>
+            </a:r>
+          </a:p>
+          <a:p>
+            <a:r>
+              <a:rPr lang="da-DK" sz="1200" dirty="0" smtClean="0">
+                <a:solidFill>
+                  <a:srgbClr val="000000"/>
+                </a:solidFill>
+                <a:latin typeface="Cascadia Mono" panose="020B0609020000020004" pitchFamily="49" charset="0"/>
+              </a:rPr>
+              <a:t>      </a:t>
+            </a:r>
+            <a:r>
+              <a:rPr lang="da-DK" sz="1200" dirty="0">
+                <a:solidFill>
+                  <a:srgbClr val="000000"/>
+                </a:solidFill>
+                <a:latin typeface="Cascadia Mono" panose="020B0609020000020004" pitchFamily="49" charset="0"/>
+              </a:rPr>
+              <a:t>{</a:t>
+            </a:r>
+          </a:p>
+          <a:p>
+            <a:r>
+              <a:rPr lang="en-US" sz="1200" dirty="0" smtClean="0">
+                <a:solidFill>
+                  <a:srgbClr val="000000"/>
+                </a:solidFill>
+                <a:latin typeface="Cascadia Mono" panose="020B0609020000020004" pitchFamily="49" charset="0"/>
+              </a:rPr>
+              <a:t>          </a:t>
+            </a:r>
+            <a:r>
+              <a:rPr lang="en-US" sz="1200" dirty="0" err="1">
+                <a:solidFill>
+                  <a:srgbClr val="000000"/>
+                </a:solidFill>
+                <a:latin typeface="Cascadia Mono" panose="020B0609020000020004" pitchFamily="49" charset="0"/>
+              </a:rPr>
+              <a:t>Console.WriteLine</a:t>
+            </a:r>
+            <a:r>
+              <a:rPr lang="en-US" sz="1200" dirty="0">
+                <a:solidFill>
+                  <a:srgbClr val="000000"/>
+                </a:solidFill>
+                <a:latin typeface="Cascadia Mono" panose="020B0609020000020004" pitchFamily="49" charset="0"/>
+              </a:rPr>
+              <a:t>(</a:t>
+            </a:r>
+            <a:r>
+              <a:rPr lang="en-US" sz="1200" dirty="0">
+                <a:solidFill>
+                  <a:srgbClr val="A31515"/>
+                </a:solidFill>
+                <a:latin typeface="Cascadia Mono" panose="020B0609020000020004" pitchFamily="49" charset="0"/>
+              </a:rPr>
+              <a:t>"Event was set - Water level: "</a:t>
+            </a:r>
+            <a:r>
+              <a:rPr lang="en-US" sz="1200" dirty="0">
+                <a:solidFill>
+                  <a:srgbClr val="000000"/>
+                </a:solidFill>
+                <a:latin typeface="Cascadia Mono" panose="020B0609020000020004" pitchFamily="49" charset="0"/>
+              </a:rPr>
+              <a:t> + </a:t>
+            </a:r>
+            <a:r>
+              <a:rPr lang="en-US" sz="1200" dirty="0" err="1">
+                <a:solidFill>
+                  <a:srgbClr val="000000"/>
+                </a:solidFill>
+                <a:latin typeface="Cascadia Mono" panose="020B0609020000020004" pitchFamily="49" charset="0"/>
+              </a:rPr>
+              <a:t>WaterLevel</a:t>
+            </a:r>
+            <a:r>
+              <a:rPr lang="en-US" sz="1200" dirty="0">
+                <a:solidFill>
+                  <a:srgbClr val="000000"/>
+                </a:solidFill>
+                <a:latin typeface="Cascadia Mono" panose="020B0609020000020004" pitchFamily="49" charset="0"/>
+              </a:rPr>
+              <a:t>);</a:t>
+            </a:r>
+          </a:p>
+          <a:p>
+            <a:r>
+              <a:rPr lang="da-DK" sz="1200" dirty="0" smtClean="0">
+                <a:solidFill>
+                  <a:srgbClr val="000000"/>
+                </a:solidFill>
+                <a:latin typeface="Cascadia Mono" panose="020B0609020000020004" pitchFamily="49" charset="0"/>
+              </a:rPr>
+              <a:t>          </a:t>
+            </a:r>
+            <a:r>
+              <a:rPr lang="da-DK" sz="1200" dirty="0" err="1">
+                <a:solidFill>
+                  <a:srgbClr val="000000"/>
+                </a:solidFill>
+                <a:latin typeface="Cascadia Mono" panose="020B0609020000020004" pitchFamily="49" charset="0"/>
+              </a:rPr>
+              <a:t>Console.WriteLine</a:t>
+            </a:r>
+            <a:r>
+              <a:rPr lang="da-DK" sz="1200" dirty="0">
+                <a:solidFill>
+                  <a:srgbClr val="000000"/>
+                </a:solidFill>
+                <a:latin typeface="Cascadia Mono" panose="020B0609020000020004" pitchFamily="49" charset="0"/>
+              </a:rPr>
+              <a:t>(</a:t>
+            </a:r>
+            <a:r>
+              <a:rPr lang="da-DK" sz="1200" dirty="0">
+                <a:solidFill>
+                  <a:srgbClr val="A31515"/>
+                </a:solidFill>
+                <a:latin typeface="Cascadia Mono" panose="020B0609020000020004" pitchFamily="49" charset="0"/>
+              </a:rPr>
+              <a:t>"</a:t>
+            </a:r>
+            <a:r>
+              <a:rPr lang="da-DK" sz="1200" dirty="0" err="1">
+                <a:solidFill>
+                  <a:srgbClr val="A31515"/>
+                </a:solidFill>
+                <a:latin typeface="Cascadia Mono" panose="020B0609020000020004" pitchFamily="49" charset="0"/>
+              </a:rPr>
+              <a:t>Running</a:t>
+            </a:r>
+            <a:r>
+              <a:rPr lang="da-DK" sz="1200" dirty="0">
+                <a:solidFill>
+                  <a:srgbClr val="A31515"/>
+                </a:solidFill>
+                <a:latin typeface="Cascadia Mono" panose="020B0609020000020004" pitchFamily="49" charset="0"/>
+              </a:rPr>
+              <a:t> pump for 2 </a:t>
+            </a:r>
+            <a:r>
+              <a:rPr lang="da-DK" sz="1200" dirty="0" err="1">
+                <a:solidFill>
+                  <a:srgbClr val="A31515"/>
+                </a:solidFill>
+                <a:latin typeface="Cascadia Mono" panose="020B0609020000020004" pitchFamily="49" charset="0"/>
+              </a:rPr>
+              <a:t>seconds</a:t>
+            </a:r>
+            <a:r>
+              <a:rPr lang="da-DK" sz="1200" dirty="0">
+                <a:solidFill>
+                  <a:srgbClr val="A31515"/>
+                </a:solidFill>
+                <a:latin typeface="Cascadia Mono" panose="020B0609020000020004" pitchFamily="49" charset="0"/>
+              </a:rPr>
+              <a:t>."</a:t>
+            </a:r>
+            <a:r>
+              <a:rPr lang="da-DK" sz="1200" dirty="0">
+                <a:solidFill>
+                  <a:srgbClr val="000000"/>
+                </a:solidFill>
+                <a:latin typeface="Cascadia Mono" panose="020B0609020000020004" pitchFamily="49" charset="0"/>
+              </a:rPr>
+              <a:t>);</a:t>
+            </a:r>
+          </a:p>
+          <a:p>
+            <a:r>
+              <a:rPr lang="da-DK" sz="1200" dirty="0" smtClean="0">
+                <a:solidFill>
+                  <a:srgbClr val="000000"/>
+                </a:solidFill>
+                <a:latin typeface="Cascadia Mono" panose="020B0609020000020004" pitchFamily="49" charset="0"/>
+              </a:rPr>
+              <a:t>      </a:t>
+            </a:r>
+            <a:r>
+              <a:rPr lang="da-DK" sz="1200" dirty="0">
+                <a:solidFill>
+                  <a:srgbClr val="000000"/>
+                </a:solidFill>
+                <a:latin typeface="Cascadia Mono" panose="020B0609020000020004" pitchFamily="49" charset="0"/>
+              </a:rPr>
+              <a:t>}</a:t>
+            </a:r>
+          </a:p>
+          <a:p>
+            <a:r>
+              <a:rPr lang="da-DK" sz="1200" dirty="0" smtClean="0">
+                <a:solidFill>
+                  <a:srgbClr val="000000"/>
+                </a:solidFill>
+                <a:latin typeface="Cascadia Mono" panose="020B0609020000020004" pitchFamily="49" charset="0"/>
+              </a:rPr>
+              <a:t>      </a:t>
+            </a:r>
+            <a:r>
+              <a:rPr lang="da-DK" sz="1200" dirty="0" err="1">
+                <a:solidFill>
+                  <a:srgbClr val="0000FF"/>
+                </a:solidFill>
+                <a:latin typeface="Cascadia Mono" panose="020B0609020000020004" pitchFamily="49" charset="0"/>
+              </a:rPr>
+              <a:t>else</a:t>
+            </a:r>
+            <a:endParaRPr lang="da-DK" sz="1200" dirty="0">
+              <a:solidFill>
+                <a:srgbClr val="000000"/>
+              </a:solidFill>
+              <a:latin typeface="Cascadia Mono" panose="020B0609020000020004" pitchFamily="49" charset="0"/>
+            </a:endParaRPr>
+          </a:p>
+          <a:p>
+            <a:r>
+              <a:rPr lang="da-DK" sz="1200" dirty="0" smtClean="0">
+                <a:solidFill>
+                  <a:srgbClr val="000000"/>
+                </a:solidFill>
+                <a:latin typeface="Cascadia Mono" panose="020B0609020000020004" pitchFamily="49" charset="0"/>
+              </a:rPr>
+              <a:t>      </a:t>
+            </a:r>
+            <a:r>
+              <a:rPr lang="da-DK" sz="1200" dirty="0">
+                <a:solidFill>
+                  <a:srgbClr val="000000"/>
+                </a:solidFill>
+                <a:latin typeface="Cascadia Mono" panose="020B0609020000020004" pitchFamily="49" charset="0"/>
+              </a:rPr>
+              <a:t>{</a:t>
+            </a:r>
+          </a:p>
+          <a:p>
+            <a:r>
+              <a:rPr lang="da-DK" sz="1200" dirty="0" smtClean="0">
+                <a:solidFill>
+                  <a:srgbClr val="000000"/>
+                </a:solidFill>
+                <a:latin typeface="Cascadia Mono" panose="020B0609020000020004" pitchFamily="49" charset="0"/>
+              </a:rPr>
+              <a:t>          </a:t>
+            </a:r>
+            <a:r>
+              <a:rPr lang="da-DK" sz="1200" dirty="0" err="1">
+                <a:solidFill>
+                  <a:srgbClr val="000000"/>
+                </a:solidFill>
+                <a:latin typeface="Cascadia Mono" panose="020B0609020000020004" pitchFamily="49" charset="0"/>
+              </a:rPr>
+              <a:t>Console.WriteLine</a:t>
+            </a:r>
+            <a:r>
+              <a:rPr lang="da-DK" sz="1200" dirty="0">
+                <a:solidFill>
+                  <a:srgbClr val="000000"/>
+                </a:solidFill>
+                <a:latin typeface="Cascadia Mono" panose="020B0609020000020004" pitchFamily="49" charset="0"/>
+              </a:rPr>
+              <a:t>(</a:t>
+            </a:r>
+            <a:r>
+              <a:rPr lang="da-DK" sz="1200" dirty="0">
+                <a:solidFill>
+                  <a:srgbClr val="A31515"/>
+                </a:solidFill>
+                <a:latin typeface="Cascadia Mono" panose="020B0609020000020004" pitchFamily="49" charset="0"/>
+              </a:rPr>
+              <a:t>"Waiting </a:t>
+            </a:r>
+            <a:r>
+              <a:rPr lang="da-DK" sz="1200" dirty="0" err="1">
+                <a:solidFill>
+                  <a:srgbClr val="A31515"/>
+                </a:solidFill>
+                <a:latin typeface="Cascadia Mono" panose="020B0609020000020004" pitchFamily="49" charset="0"/>
+              </a:rPr>
+              <a:t>timed</a:t>
+            </a:r>
+            <a:r>
+              <a:rPr lang="da-DK" sz="1200" dirty="0">
+                <a:solidFill>
+                  <a:srgbClr val="A31515"/>
+                </a:solidFill>
+                <a:latin typeface="Cascadia Mono" panose="020B0609020000020004" pitchFamily="49" charset="0"/>
+              </a:rPr>
+              <a:t> out"</a:t>
+            </a:r>
+            <a:r>
+              <a:rPr lang="da-DK" sz="1200" dirty="0">
+                <a:solidFill>
+                  <a:srgbClr val="000000"/>
+                </a:solidFill>
+                <a:latin typeface="Cascadia Mono" panose="020B0609020000020004" pitchFamily="49" charset="0"/>
+              </a:rPr>
+              <a:t>);</a:t>
+            </a:r>
+          </a:p>
+          <a:p>
+            <a:r>
+              <a:rPr lang="da-DK" sz="1200" dirty="0" smtClean="0">
+                <a:solidFill>
+                  <a:srgbClr val="000000"/>
+                </a:solidFill>
+                <a:latin typeface="Cascadia Mono" panose="020B0609020000020004" pitchFamily="49" charset="0"/>
+              </a:rPr>
+              <a:t>      </a:t>
+            </a:r>
+            <a:r>
+              <a:rPr lang="da-DK" sz="1200" dirty="0">
+                <a:solidFill>
+                  <a:srgbClr val="000000"/>
+                </a:solidFill>
+                <a:latin typeface="Cascadia Mono" panose="020B0609020000020004" pitchFamily="49" charset="0"/>
+              </a:rPr>
+              <a:t>}</a:t>
+            </a:r>
+          </a:p>
+          <a:p>
+            <a:r>
+              <a:rPr lang="da-DK" sz="1200" dirty="0" smtClean="0">
+                <a:solidFill>
+                  <a:srgbClr val="000000"/>
+                </a:solidFill>
+                <a:latin typeface="Cascadia Mono" panose="020B0609020000020004" pitchFamily="49" charset="0"/>
+              </a:rPr>
+              <a:t>  </a:t>
+            </a:r>
+            <a:r>
+              <a:rPr lang="da-DK" sz="1200" dirty="0">
+                <a:solidFill>
+                  <a:srgbClr val="000000"/>
+                </a:solidFill>
+                <a:latin typeface="Cascadia Mono" panose="020B0609020000020004" pitchFamily="49" charset="0"/>
+              </a:rPr>
+              <a:t>}</a:t>
+            </a:r>
+          </a:p>
+          <a:p>
+            <a:r>
+              <a:rPr lang="da-DK" sz="1200" dirty="0" smtClean="0">
+                <a:solidFill>
+                  <a:srgbClr val="000000"/>
+                </a:solidFill>
+                <a:latin typeface="Cascadia Mono" panose="020B0609020000020004" pitchFamily="49" charset="0"/>
+              </a:rPr>
+              <a:t>}</a:t>
+            </a:r>
+            <a:endParaRPr lang="da-DK" sz="1200" dirty="0">
+              <a:solidFill>
+                <a:srgbClr val="000000"/>
+              </a:solidFill>
+              <a:latin typeface="Cascadia Mono" panose="020B0609020000020004" pitchFamily="49" charset="0"/>
+            </a:endParaRPr>
+          </a:p>
+          <a:p>
+            <a:endParaRPr lang="da-DK" sz="1200" dirty="0">
+              <a:solidFill>
+                <a:srgbClr val="000000"/>
+              </a:solidFill>
+              <a:latin typeface="Cascadia Mono" panose="020B0609020000020004" pitchFamily="49" charset="0"/>
+            </a:endParaRPr>
+          </a:p>
+          <a:p>
+            <a:r>
+              <a:rPr lang="en-US" sz="1200" dirty="0" smtClean="0">
+                <a:solidFill>
+                  <a:srgbClr val="000000"/>
+                </a:solidFill>
+                <a:latin typeface="Cascadia Mono" panose="020B0609020000020004" pitchFamily="49" charset="0"/>
+              </a:rPr>
+              <a:t> </a:t>
+            </a:r>
+            <a:r>
+              <a:rPr lang="en-US" sz="1200" dirty="0" smtClean="0">
+                <a:solidFill>
+                  <a:srgbClr val="0000FF"/>
+                </a:solidFill>
+                <a:latin typeface="Cascadia Mono" panose="020B0609020000020004" pitchFamily="49" charset="0"/>
+              </a:rPr>
+              <a:t>public</a:t>
+            </a:r>
+            <a:r>
+              <a:rPr lang="en-US" sz="1200" dirty="0" smtClean="0">
+                <a:solidFill>
+                  <a:srgbClr val="000000"/>
+                </a:solidFill>
+                <a:latin typeface="Cascadia Mono" panose="020B0609020000020004" pitchFamily="49" charset="0"/>
+              </a:rPr>
+              <a:t> </a:t>
+            </a:r>
+            <a:r>
+              <a:rPr lang="en-US" sz="1200" dirty="0">
+                <a:solidFill>
+                  <a:srgbClr val="0000FF"/>
+                </a:solidFill>
+                <a:latin typeface="Cascadia Mono" panose="020B0609020000020004" pitchFamily="49" charset="0"/>
+              </a:rPr>
+              <a:t>bool</a:t>
+            </a:r>
+            <a:r>
+              <a:rPr lang="en-US" sz="1200" dirty="0">
+                <a:solidFill>
+                  <a:srgbClr val="000000"/>
+                </a:solidFill>
+                <a:latin typeface="Cascadia Mono" panose="020B0609020000020004" pitchFamily="49" charset="0"/>
+              </a:rPr>
+              <a:t> </a:t>
+            </a:r>
+            <a:r>
+              <a:rPr lang="en-US" sz="1200" dirty="0" err="1">
+                <a:solidFill>
+                  <a:srgbClr val="000000"/>
+                </a:solidFill>
+                <a:latin typeface="Cascadia Mono" panose="020B0609020000020004" pitchFamily="49" charset="0"/>
+              </a:rPr>
+              <a:t>ShallStop</a:t>
+            </a:r>
+            <a:r>
+              <a:rPr lang="en-US" sz="1200" dirty="0">
+                <a:solidFill>
+                  <a:srgbClr val="000000"/>
+                </a:solidFill>
+                <a:latin typeface="Cascadia Mono" panose="020B0609020000020004" pitchFamily="49" charset="0"/>
+              </a:rPr>
+              <a:t> { </a:t>
+            </a:r>
+            <a:r>
+              <a:rPr lang="en-US" sz="1200" dirty="0">
+                <a:solidFill>
+                  <a:srgbClr val="0000FF"/>
+                </a:solidFill>
+                <a:latin typeface="Cascadia Mono" panose="020B0609020000020004" pitchFamily="49" charset="0"/>
+              </a:rPr>
+              <a:t>get</a:t>
+            </a:r>
+            <a:r>
+              <a:rPr lang="en-US" sz="1200" dirty="0">
+                <a:solidFill>
+                  <a:srgbClr val="000000"/>
+                </a:solidFill>
+                <a:latin typeface="Cascadia Mono" panose="020B0609020000020004" pitchFamily="49" charset="0"/>
+              </a:rPr>
+              <a:t>; </a:t>
+            </a:r>
+            <a:r>
+              <a:rPr lang="en-US" sz="1200" dirty="0">
+                <a:solidFill>
+                  <a:srgbClr val="0000FF"/>
+                </a:solidFill>
+                <a:latin typeface="Cascadia Mono" panose="020B0609020000020004" pitchFamily="49" charset="0"/>
+              </a:rPr>
+              <a:t>set</a:t>
+            </a:r>
+            <a:r>
+              <a:rPr lang="en-US" sz="1200" dirty="0">
+                <a:solidFill>
+                  <a:srgbClr val="000000"/>
+                </a:solidFill>
+                <a:latin typeface="Cascadia Mono" panose="020B0609020000020004" pitchFamily="49" charset="0"/>
+              </a:rPr>
+              <a:t>; }</a:t>
+            </a:r>
+            <a:endParaRPr lang="da-DK" sz="1200" dirty="0">
+              <a:solidFill>
+                <a:srgbClr val="000000"/>
+              </a:solidFill>
+              <a:latin typeface="Cascadia Mono" panose="020B0609020000020004" pitchFamily="49" charset="0"/>
+            </a:endParaRPr>
+          </a:p>
+        </p:txBody>
+      </p:sp>
+    </p:spTree>
+    <p:extLst>
+      <p:ext uri="{BB962C8B-B14F-4D97-AF65-F5344CB8AC3E}">
+        <p14:creationId xmlns:p14="http://schemas.microsoft.com/office/powerpoint/2010/main" val="982922957"/>
+      </p:ext>
+    </p:extLst>
+  </p:cSld>
+  <p:clrMapOvr>
+    <a:masterClrMapping/>
+  </p:clrMapOvr>
+  <p:timing>
+    <p:tnLst>
+      <p:par>
+        <p:cTn id="1" dur="indefinite" restart="never" nodeType="tmRoot"/>
+      </p:par>
+    </p:tnLst>
+  </p:timing>
+</p:sld>
+</file>
+
+<file path=ppt/slides/slide38.xml><?xml version="1.0" encoding="utf-8"?>
+<p:sld xmlns:a="http://schemas.openxmlformats.org/drawingml/2006/main" xmlns:r="http://schemas.openxmlformats.org/officeDocument/2006/relationships" xmlns:p="http://schemas.openxmlformats.org/presentationml/2006/main">
+  <p:cSld>
+    <p:spTree>
+      <p:nvGrpSpPr>
+        <p:cNvPr id="1" name=""/>
+        <p:cNvGrpSpPr/>
+        <p:nvPr/>
+      </p:nvGrpSpPr>
+      <p:grpSpPr>
+        <a:xfrm>
+          <a:off x="0" y="0"/>
+          <a:ext cx="0" cy="0"/>
+          <a:chOff x="0" y="0"/>
+          <a:chExt cx="0" cy="0"/>
+        </a:xfrm>
+      </p:grpSpPr>
+      <p:sp>
+        <p:nvSpPr>
+          <p:cNvPr id="2" name="Title 1"/>
+          <p:cNvSpPr>
+            <a:spLocks noGrp="1"/>
+          </p:cNvSpPr>
+          <p:nvPr>
+            <p:ph type="title"/>
+          </p:nvPr>
+        </p:nvSpPr>
+        <p:spPr/>
+        <p:txBody>
+          <a:bodyPr/>
+          <a:lstStyle/>
+          <a:p>
+            <a:r>
+              <a:rPr lang="da-DK" dirty="0" err="1" smtClean="0"/>
+              <a:t>PumpController</a:t>
+            </a:r>
+            <a:r>
+              <a:rPr lang="da-DK" dirty="0" smtClean="0"/>
+              <a:t> as Observer</a:t>
+            </a:r>
+            <a:endParaRPr lang="da-DK" dirty="0"/>
+          </a:p>
+        </p:txBody>
+      </p:sp>
+      <p:sp>
+        <p:nvSpPr>
+          <p:cNvPr id="4" name="Rectangle 3"/>
+          <p:cNvSpPr/>
+          <p:nvPr/>
+        </p:nvSpPr>
+        <p:spPr>
+          <a:xfrm>
+            <a:off x="152400" y="1311965"/>
+            <a:ext cx="5631180" cy="5400120"/>
+          </a:xfrm>
+          <a:prstGeom prst="rect">
+            <a:avLst/>
+          </a:prstGeom>
+          <a:solidFill>
+            <a:schemeClr val="bg2"/>
+          </a:solidFill>
+        </p:spPr>
+        <p:style>
+          <a:lnRef idx="2">
+            <a:schemeClr val="accent1">
+              <a:shade val="50000"/>
+            </a:schemeClr>
+          </a:lnRef>
+          <a:fillRef idx="1">
+            <a:schemeClr val="accent1"/>
+          </a:fillRef>
+          <a:effectRef idx="0">
+            <a:schemeClr val="accent1"/>
+          </a:effectRef>
+          <a:fontRef idx="minor">
+            <a:schemeClr val="lt1"/>
+          </a:fontRef>
+        </p:style>
+        <p:txBody>
+          <a:bodyPr rtlCol="0" anchor="ctr"/>
+          <a:lstStyle/>
+          <a:p>
+            <a:r>
+              <a:rPr lang="da-DK" sz="1200">
+                <a:solidFill>
+                  <a:srgbClr val="000000"/>
+                </a:solidFill>
+                <a:latin typeface="Cascadia Mono" panose="020B0609020000020004" pitchFamily="49" charset="0"/>
+              </a:rPr>
+              <a:t> </a:t>
+            </a:r>
+            <a:r>
+              <a:rPr lang="da-DK" sz="1200">
+                <a:solidFill>
+                  <a:srgbClr val="0000FF"/>
+                </a:solidFill>
+                <a:latin typeface="Cascadia Mono" panose="020B0609020000020004" pitchFamily="49" charset="0"/>
+              </a:rPr>
+              <a:t>public</a:t>
+            </a:r>
+            <a:r>
+              <a:rPr lang="da-DK" sz="1200">
+                <a:solidFill>
+                  <a:srgbClr val="000000"/>
+                </a:solidFill>
+                <a:latin typeface="Cascadia Mono" panose="020B0609020000020004" pitchFamily="49" charset="0"/>
+              </a:rPr>
+              <a:t> </a:t>
+            </a:r>
+            <a:r>
+              <a:rPr lang="da-DK" sz="1200">
+                <a:solidFill>
+                  <a:srgbClr val="0000FF"/>
+                </a:solidFill>
+                <a:latin typeface="Cascadia Mono" panose="020B0609020000020004" pitchFamily="49" charset="0"/>
+              </a:rPr>
+              <a:t>int</a:t>
+            </a:r>
+            <a:r>
+              <a:rPr lang="da-DK" sz="1200">
+                <a:solidFill>
+                  <a:srgbClr val="000000"/>
+                </a:solidFill>
+                <a:latin typeface="Cascadia Mono" panose="020B0609020000020004" pitchFamily="49" charset="0"/>
+              </a:rPr>
+              <a:t> WaterLevel</a:t>
+            </a:r>
+          </a:p>
+          <a:p>
+            <a:r>
+              <a:rPr lang="da-DK" sz="1200">
+                <a:solidFill>
+                  <a:srgbClr val="000000"/>
+                </a:solidFill>
+                <a:latin typeface="Cascadia Mono" panose="020B0609020000020004" pitchFamily="49" charset="0"/>
+              </a:rPr>
+              <a:t>    {</a:t>
+            </a:r>
+          </a:p>
+          <a:p>
+            <a:r>
+              <a:rPr lang="da-DK" sz="1200">
+                <a:solidFill>
+                  <a:srgbClr val="000000"/>
+                </a:solidFill>
+                <a:latin typeface="Cascadia Mono" panose="020B0609020000020004" pitchFamily="49" charset="0"/>
+              </a:rPr>
+              <a:t>        </a:t>
+            </a:r>
+            <a:r>
+              <a:rPr lang="da-DK" sz="1200">
+                <a:solidFill>
+                  <a:srgbClr val="0000FF"/>
+                </a:solidFill>
+                <a:latin typeface="Cascadia Mono" panose="020B0609020000020004" pitchFamily="49" charset="0"/>
+              </a:rPr>
+              <a:t>get</a:t>
+            </a:r>
+            <a:endParaRPr lang="da-DK" sz="1200">
+              <a:solidFill>
+                <a:srgbClr val="000000"/>
+              </a:solidFill>
+              <a:latin typeface="Cascadia Mono" panose="020B0609020000020004" pitchFamily="49" charset="0"/>
+            </a:endParaRPr>
+          </a:p>
+          <a:p>
+            <a:r>
+              <a:rPr lang="da-DK" sz="1200">
+                <a:solidFill>
+                  <a:srgbClr val="000000"/>
+                </a:solidFill>
+                <a:latin typeface="Cascadia Mono" panose="020B0609020000020004" pitchFamily="49" charset="0"/>
+              </a:rPr>
+              <a:t>        {</a:t>
+            </a:r>
+          </a:p>
+          <a:p>
+            <a:r>
+              <a:rPr lang="da-DK" sz="1200">
+                <a:solidFill>
+                  <a:srgbClr val="000000"/>
+                </a:solidFill>
+                <a:latin typeface="Cascadia Mono" panose="020B0609020000020004" pitchFamily="49" charset="0"/>
+              </a:rPr>
+              <a:t>            </a:t>
+            </a:r>
+            <a:r>
+              <a:rPr lang="da-DK" sz="1200">
+                <a:solidFill>
+                  <a:srgbClr val="0000FF"/>
+                </a:solidFill>
+                <a:latin typeface="Cascadia Mono" panose="020B0609020000020004" pitchFamily="49" charset="0"/>
+              </a:rPr>
+              <a:t>lock</a:t>
+            </a:r>
+            <a:r>
+              <a:rPr lang="da-DK" sz="1200">
+                <a:solidFill>
+                  <a:srgbClr val="000000"/>
+                </a:solidFill>
+                <a:latin typeface="Cascadia Mono" panose="020B0609020000020004" pitchFamily="49" charset="0"/>
+              </a:rPr>
+              <a:t> (_waterLevelLockObject)</a:t>
+            </a:r>
+          </a:p>
+          <a:p>
+            <a:r>
+              <a:rPr lang="da-DK" sz="1200">
+                <a:solidFill>
+                  <a:srgbClr val="000000"/>
+                </a:solidFill>
+                <a:latin typeface="Cascadia Mono" panose="020B0609020000020004" pitchFamily="49" charset="0"/>
+              </a:rPr>
+              <a:t>            {</a:t>
+            </a:r>
+          </a:p>
+          <a:p>
+            <a:r>
+              <a:rPr lang="da-DK" sz="1200">
+                <a:solidFill>
+                  <a:srgbClr val="000000"/>
+                </a:solidFill>
+                <a:latin typeface="Cascadia Mono" panose="020B0609020000020004" pitchFamily="49" charset="0"/>
+              </a:rPr>
+              <a:t>                </a:t>
+            </a:r>
+            <a:r>
+              <a:rPr lang="da-DK" sz="1200">
+                <a:solidFill>
+                  <a:srgbClr val="0000FF"/>
+                </a:solidFill>
+                <a:latin typeface="Cascadia Mono" panose="020B0609020000020004" pitchFamily="49" charset="0"/>
+              </a:rPr>
+              <a:t>return</a:t>
+            </a:r>
+            <a:r>
+              <a:rPr lang="da-DK" sz="1200">
+                <a:solidFill>
+                  <a:srgbClr val="000000"/>
+                </a:solidFill>
+                <a:latin typeface="Cascadia Mono" panose="020B0609020000020004" pitchFamily="49" charset="0"/>
+              </a:rPr>
+              <a:t> _waterLevel;</a:t>
+            </a:r>
+          </a:p>
+          <a:p>
+            <a:r>
+              <a:rPr lang="da-DK" sz="1200">
+                <a:solidFill>
+                  <a:srgbClr val="000000"/>
+                </a:solidFill>
+                <a:latin typeface="Cascadia Mono" panose="020B0609020000020004" pitchFamily="49" charset="0"/>
+              </a:rPr>
+              <a:t>            }</a:t>
+            </a:r>
+          </a:p>
+          <a:p>
+            <a:r>
+              <a:rPr lang="da-DK" sz="1200">
+                <a:solidFill>
+                  <a:srgbClr val="000000"/>
+                </a:solidFill>
+                <a:latin typeface="Cascadia Mono" panose="020B0609020000020004" pitchFamily="49" charset="0"/>
+              </a:rPr>
+              <a:t>        }</a:t>
+            </a:r>
+          </a:p>
+          <a:p>
+            <a:r>
+              <a:rPr lang="da-DK" sz="1200">
+                <a:solidFill>
+                  <a:srgbClr val="000000"/>
+                </a:solidFill>
+                <a:latin typeface="Cascadia Mono" panose="020B0609020000020004" pitchFamily="49" charset="0"/>
+              </a:rPr>
+              <a:t>        </a:t>
+            </a:r>
+            <a:r>
+              <a:rPr lang="da-DK" sz="1200">
+                <a:solidFill>
+                  <a:srgbClr val="0000FF"/>
+                </a:solidFill>
+                <a:latin typeface="Cascadia Mono" panose="020B0609020000020004" pitchFamily="49" charset="0"/>
+              </a:rPr>
+              <a:t>set</a:t>
+            </a:r>
+            <a:endParaRPr lang="da-DK" sz="1200">
+              <a:solidFill>
+                <a:srgbClr val="000000"/>
+              </a:solidFill>
+              <a:latin typeface="Cascadia Mono" panose="020B0609020000020004" pitchFamily="49" charset="0"/>
+            </a:endParaRPr>
+          </a:p>
+          <a:p>
+            <a:r>
+              <a:rPr lang="da-DK" sz="1200">
+                <a:solidFill>
+                  <a:srgbClr val="000000"/>
+                </a:solidFill>
+                <a:latin typeface="Cascadia Mono" panose="020B0609020000020004" pitchFamily="49" charset="0"/>
+              </a:rPr>
+              <a:t>        {</a:t>
+            </a:r>
+          </a:p>
+          <a:p>
+            <a:r>
+              <a:rPr lang="da-DK" sz="1200">
+                <a:solidFill>
+                  <a:srgbClr val="000000"/>
+                </a:solidFill>
+                <a:latin typeface="Cascadia Mono" panose="020B0609020000020004" pitchFamily="49" charset="0"/>
+              </a:rPr>
+              <a:t>            </a:t>
+            </a:r>
+            <a:r>
+              <a:rPr lang="da-DK" sz="1200">
+                <a:solidFill>
+                  <a:srgbClr val="0000FF"/>
+                </a:solidFill>
+                <a:latin typeface="Cascadia Mono" panose="020B0609020000020004" pitchFamily="49" charset="0"/>
+              </a:rPr>
+              <a:t>lock</a:t>
+            </a:r>
+            <a:r>
+              <a:rPr lang="da-DK" sz="1200">
+                <a:solidFill>
+                  <a:srgbClr val="000000"/>
+                </a:solidFill>
+                <a:latin typeface="Cascadia Mono" panose="020B0609020000020004" pitchFamily="49" charset="0"/>
+              </a:rPr>
+              <a:t> (_waterLevelLockObject)</a:t>
+            </a:r>
+          </a:p>
+          <a:p>
+            <a:r>
+              <a:rPr lang="da-DK" sz="1200">
+                <a:solidFill>
+                  <a:srgbClr val="000000"/>
+                </a:solidFill>
+                <a:latin typeface="Cascadia Mono" panose="020B0609020000020004" pitchFamily="49" charset="0"/>
+              </a:rPr>
+              <a:t>            {</a:t>
+            </a:r>
+          </a:p>
+          <a:p>
+            <a:r>
+              <a:rPr lang="da-DK" sz="1200">
+                <a:solidFill>
+                  <a:srgbClr val="000000"/>
+                </a:solidFill>
+                <a:latin typeface="Cascadia Mono" panose="020B0609020000020004" pitchFamily="49" charset="0"/>
+              </a:rPr>
+              <a:t>                _waterLevel = value;</a:t>
+            </a:r>
+          </a:p>
+          <a:p>
+            <a:r>
+              <a:rPr lang="da-DK" sz="1200">
+                <a:solidFill>
+                  <a:srgbClr val="000000"/>
+                </a:solidFill>
+                <a:latin typeface="Cascadia Mono" panose="020B0609020000020004" pitchFamily="49" charset="0"/>
+              </a:rPr>
+              <a:t>            }</a:t>
+            </a:r>
+          </a:p>
+          <a:p>
+            <a:r>
+              <a:rPr lang="da-DK" sz="1200">
+                <a:solidFill>
+                  <a:srgbClr val="000000"/>
+                </a:solidFill>
+                <a:latin typeface="Cascadia Mono" panose="020B0609020000020004" pitchFamily="49" charset="0"/>
+              </a:rPr>
+              <a:t>        }</a:t>
+            </a:r>
+          </a:p>
+          <a:p>
+            <a:r>
+              <a:rPr lang="da-DK" sz="1200">
+                <a:solidFill>
+                  <a:srgbClr val="000000"/>
+                </a:solidFill>
+                <a:latin typeface="Cascadia Mono" panose="020B0609020000020004" pitchFamily="49" charset="0"/>
+              </a:rPr>
+              <a:t>    }</a:t>
+            </a:r>
+            <a:endParaRPr lang="da-DK" sz="1200" dirty="0">
+              <a:solidFill>
+                <a:srgbClr val="000000"/>
+              </a:solidFill>
+              <a:latin typeface="Cascadia Mono" panose="020B0609020000020004" pitchFamily="49" charset="0"/>
+            </a:endParaRPr>
+          </a:p>
+        </p:txBody>
+      </p:sp>
+    </p:spTree>
+    <p:extLst>
+      <p:ext uri="{BB962C8B-B14F-4D97-AF65-F5344CB8AC3E}">
+        <p14:creationId xmlns:p14="http://schemas.microsoft.com/office/powerpoint/2010/main" val="3511407509"/>
+      </p:ext>
+    </p:extLst>
+  </p:cSld>
+  <p:clrMapOvr>
+    <a:masterClrMapping/>
+  </p:clrMapOvr>
+  <p:timing>
+    <p:tnLst>
+      <p:par>
+        <p:cTn id="1" dur="indefinite" restart="never" nodeType="tmRoot"/>
+      </p:par>
+    </p:tnLst>
+  </p:timing>
+</p:sld>
+</file>
+
+<file path=ppt/slides/slide39.xml><?xml version="1.0" encoding="utf-8"?>
 <p:sld xmlns:a="http://schemas.openxmlformats.org/drawingml/2006/main" xmlns:r="http://schemas.openxmlformats.org/officeDocument/2006/relationships" xmlns:p="http://schemas.openxmlformats.org/presentationml/2006/main">
   <p:cSld>
     <p:spTree>
@@ -17356,209 +20641,6 @@
 </p:sld>
 </file>
 
-<file path=ppt/slides/slide35.xml><?xml version="1.0" encoding="utf-8"?>
-<p:sld xmlns:a="http://schemas.openxmlformats.org/drawingml/2006/main" xmlns:r="http://schemas.openxmlformats.org/officeDocument/2006/relationships" xmlns:p="http://schemas.openxmlformats.org/presentationml/2006/main">
-  <p:cSld>
-    <p:spTree>
-      <p:nvGrpSpPr>
-        <p:cNvPr id="1" name=""/>
-        <p:cNvGrpSpPr/>
-        <p:nvPr/>
-      </p:nvGrpSpPr>
-      <p:grpSpPr>
-        <a:xfrm>
-          <a:off x="0" y="0"/>
-          <a:ext cx="0" cy="0"/>
-          <a:chOff x="0" y="0"/>
-          <a:chExt cx="0" cy="0"/>
-        </a:xfrm>
-      </p:grpSpPr>
-      <p:sp>
-        <p:nvSpPr>
-          <p:cNvPr id="3" name="Title 2"/>
-          <p:cNvSpPr>
-            <a:spLocks noGrp="1"/>
-          </p:cNvSpPr>
-          <p:nvPr>
-            <p:ph type="title"/>
-          </p:nvPr>
-        </p:nvSpPr>
-        <p:spPr/>
-        <p:txBody>
-          <a:bodyPr/>
-          <a:lstStyle/>
-          <a:p>
-            <a:r>
-              <a:rPr lang="da-DK" dirty="0"/>
-              <a:t>References and image </a:t>
-            </a:r>
-            <a:r>
-              <a:rPr lang="da-DK" dirty="0" err="1"/>
-              <a:t>sources</a:t>
-            </a:r>
-            <a:endParaRPr lang="da-DK" dirty="0"/>
-          </a:p>
-        </p:txBody>
-      </p:sp>
-      <p:sp>
-        <p:nvSpPr>
-          <p:cNvPr id="4" name="Content Placeholder 3"/>
-          <p:cNvSpPr>
-            <a:spLocks noGrp="1"/>
-          </p:cNvSpPr>
-          <p:nvPr>
-            <p:ph idx="1"/>
-          </p:nvPr>
-        </p:nvSpPr>
-        <p:spPr/>
-        <p:txBody>
-          <a:bodyPr>
-            <a:normAutofit/>
-          </a:bodyPr>
-          <a:lstStyle/>
-          <a:p>
-            <a:pPr marL="0" indent="0">
-              <a:buNone/>
-            </a:pPr>
-            <a:r>
-              <a:rPr lang="da-DK" sz="1800" dirty="0"/>
-              <a:t>Images:</a:t>
-            </a:r>
-          </a:p>
-          <a:p>
-            <a:pPr marL="0" indent="0">
-              <a:buNone/>
-            </a:pPr>
-            <a:r>
-              <a:rPr lang="da-DK" sz="1800" dirty="0"/>
-              <a:t>Printer: </a:t>
-            </a:r>
-            <a:r>
-              <a:rPr lang="da-DK" sz="1800" dirty="0">
-                <a:hlinkClick r:id="rId2"/>
-              </a:rPr>
-              <a:t>https://i5.walmartimages.com/asr/5bf8c70c-c0f4-46c8-8de2-d14417c3dcdb_2.a974142a063bb1f235f672f9a68eeb10.jpeg</a:t>
-            </a:r>
-            <a:endParaRPr lang="da-DK" sz="1800" dirty="0"/>
-          </a:p>
-          <a:p>
-            <a:pPr marL="0" indent="0">
-              <a:buNone/>
-            </a:pPr>
-            <a:r>
-              <a:rPr lang="da-DK" sz="1800" dirty="0"/>
-              <a:t>TPMS: </a:t>
-            </a:r>
-            <a:r>
-              <a:rPr lang="da-DK" sz="1800" dirty="0">
-                <a:hlinkClick r:id="rId3"/>
-              </a:rPr>
-              <a:t>http://www.rematiptop.com/tpms/img/TPMS-warning-light.jpg</a:t>
-            </a:r>
-            <a:endParaRPr lang="da-DK" sz="1800" dirty="0"/>
-          </a:p>
-          <a:p>
-            <a:pPr marL="0" indent="0">
-              <a:buNone/>
-            </a:pPr>
-            <a:r>
-              <a:rPr lang="da-DK" sz="1800" dirty="0"/>
-              <a:t>Computer keyboard: </a:t>
-            </a:r>
-            <a:r>
-              <a:rPr lang="da-DK" sz="1800" dirty="0">
-                <a:hlinkClick r:id="rId4"/>
-              </a:rPr>
-              <a:t>http://stockmedia.cc/computing_technology/slides/DSD_8790.jpg</a:t>
-            </a:r>
-            <a:endParaRPr lang="da-DK" sz="1800" dirty="0"/>
-          </a:p>
-          <a:p>
-            <a:pPr marL="0" indent="0">
-              <a:buNone/>
-            </a:pPr>
-            <a:r>
-              <a:rPr lang="da-DK" sz="1800" dirty="0"/>
-              <a:t>Bonus: </a:t>
-            </a:r>
-            <a:r>
-              <a:rPr lang="da-DK" sz="1800" dirty="0">
-                <a:hlinkClick r:id="rId5"/>
-              </a:rPr>
-              <a:t>http://wjreviews.com/reviews-cta/bonus.png</a:t>
-            </a:r>
-            <a:endParaRPr lang="da-DK" sz="1800" dirty="0"/>
-          </a:p>
-          <a:p>
-            <a:pPr marL="0" indent="0">
-              <a:buNone/>
-            </a:pPr>
-            <a:endParaRPr lang="da-DK" dirty="0"/>
-          </a:p>
-        </p:txBody>
-      </p:sp>
-    </p:spTree>
-    <p:extLst>
-      <p:ext uri="{BB962C8B-B14F-4D97-AF65-F5344CB8AC3E}">
-        <p14:creationId xmlns:p14="http://schemas.microsoft.com/office/powerpoint/2010/main" val="3336927857"/>
-      </p:ext>
-    </p:extLst>
-  </p:cSld>
-  <p:clrMapOvr>
-    <a:masterClrMapping/>
-  </p:clrMapOvr>
-</p:sld>
-</file>
-
-<file path=ppt/slides/slide36.xml><?xml version="1.0" encoding="utf-8"?>
-<p:sld xmlns:a="http://schemas.openxmlformats.org/drawingml/2006/main" xmlns:r="http://schemas.openxmlformats.org/officeDocument/2006/relationships" xmlns:p="http://schemas.openxmlformats.org/presentationml/2006/main">
-  <p:cSld>
-    <p:spTree>
-      <p:nvGrpSpPr>
-        <p:cNvPr id="1" name=""/>
-        <p:cNvGrpSpPr/>
-        <p:nvPr/>
-      </p:nvGrpSpPr>
-      <p:grpSpPr>
-        <a:xfrm>
-          <a:off x="0" y="0"/>
-          <a:ext cx="0" cy="0"/>
-          <a:chOff x="0" y="0"/>
-          <a:chExt cx="0" cy="0"/>
-        </a:xfrm>
-      </p:grpSpPr>
-      <p:sp>
-        <p:nvSpPr>
-          <p:cNvPr id="4" name="Title 3"/>
-          <p:cNvSpPr>
-            <a:spLocks noGrp="1"/>
-          </p:cNvSpPr>
-          <p:nvPr>
-            <p:ph type="title"/>
-          </p:nvPr>
-        </p:nvSpPr>
-        <p:spPr/>
-        <p:txBody>
-          <a:bodyPr/>
-          <a:lstStyle/>
-          <a:p>
-            <a:endParaRPr lang="da-DK"/>
-          </a:p>
-        </p:txBody>
-      </p:sp>
-    </p:spTree>
-    <p:extLst>
-      <p:ext uri="{BB962C8B-B14F-4D97-AF65-F5344CB8AC3E}">
-        <p14:creationId xmlns:p14="http://schemas.microsoft.com/office/powerpoint/2010/main" val="3808375499"/>
-      </p:ext>
-    </p:extLst>
-  </p:cSld>
-  <p:clrMapOvr>
-    <a:masterClrMapping/>
-  </p:clrMapOvr>
-</p:sld>
-</file>
-
 <file path=ppt/slides/slide4.xml><?xml version="1.0" encoding="utf-8"?>
 <p:sld xmlns:a="http://schemas.openxmlformats.org/drawingml/2006/main" xmlns:r="http://schemas.openxmlformats.org/officeDocument/2006/relationships" xmlns:p="http://schemas.openxmlformats.org/presentationml/2006/main">
   <p:cSld>
@@ -17781,6 +20863,216 @@
   <p:clrMapOvr>
     <a:masterClrMapping/>
   </p:clrMapOvr>
+  <p:timing>
+    <p:tnLst>
+      <p:par>
+        <p:cTn id="1" dur="indefinite" restart="never" nodeType="tmRoot"/>
+      </p:par>
+    </p:tnLst>
+  </p:timing>
+</p:sld>
+</file>
+
+<file path=ppt/slides/slide40.xml><?xml version="1.0" encoding="utf-8"?>
+<p:sld xmlns:a="http://schemas.openxmlformats.org/drawingml/2006/main" xmlns:r="http://schemas.openxmlformats.org/officeDocument/2006/relationships" xmlns:p="http://schemas.openxmlformats.org/presentationml/2006/main">
+  <p:cSld>
+    <p:spTree>
+      <p:nvGrpSpPr>
+        <p:cNvPr id="1" name=""/>
+        <p:cNvGrpSpPr/>
+        <p:nvPr/>
+      </p:nvGrpSpPr>
+      <p:grpSpPr>
+        <a:xfrm>
+          <a:off x="0" y="0"/>
+          <a:ext cx="0" cy="0"/>
+          <a:chOff x="0" y="0"/>
+          <a:chExt cx="0" cy="0"/>
+        </a:xfrm>
+      </p:grpSpPr>
+      <p:sp>
+        <p:nvSpPr>
+          <p:cNvPr id="3" name="Title 2"/>
+          <p:cNvSpPr>
+            <a:spLocks noGrp="1"/>
+          </p:cNvSpPr>
+          <p:nvPr>
+            <p:ph type="title"/>
+          </p:nvPr>
+        </p:nvSpPr>
+        <p:spPr/>
+        <p:txBody>
+          <a:bodyPr/>
+          <a:lstStyle/>
+          <a:p>
+            <a:r>
+              <a:rPr lang="da-DK" dirty="0"/>
+              <a:t>References and image </a:t>
+            </a:r>
+            <a:r>
+              <a:rPr lang="da-DK" dirty="0" err="1"/>
+              <a:t>sources</a:t>
+            </a:r>
+            <a:endParaRPr lang="da-DK" dirty="0"/>
+          </a:p>
+        </p:txBody>
+      </p:sp>
+      <p:sp>
+        <p:nvSpPr>
+          <p:cNvPr id="4" name="Content Placeholder 3"/>
+          <p:cNvSpPr>
+            <a:spLocks noGrp="1"/>
+          </p:cNvSpPr>
+          <p:nvPr>
+            <p:ph idx="1"/>
+          </p:nvPr>
+        </p:nvSpPr>
+        <p:spPr/>
+        <p:txBody>
+          <a:bodyPr>
+            <a:normAutofit/>
+          </a:bodyPr>
+          <a:lstStyle/>
+          <a:p>
+            <a:pPr marL="0" indent="0">
+              <a:buNone/>
+            </a:pPr>
+            <a:r>
+              <a:rPr lang="da-DK" sz="1800" dirty="0"/>
+              <a:t>Images:</a:t>
+            </a:r>
+          </a:p>
+          <a:p>
+            <a:pPr marL="0" indent="0">
+              <a:buNone/>
+            </a:pPr>
+            <a:r>
+              <a:rPr lang="da-DK" sz="1800" dirty="0"/>
+              <a:t>Printer: </a:t>
+            </a:r>
+            <a:r>
+              <a:rPr lang="da-DK" sz="1800" dirty="0">
+                <a:hlinkClick r:id="rId2"/>
+              </a:rPr>
+              <a:t>https://i5.walmartimages.com/asr/5bf8c70c-c0f4-46c8-8de2-d14417c3dcdb_2.a974142a063bb1f235f672f9a68eeb10.jpeg</a:t>
+            </a:r>
+            <a:endParaRPr lang="da-DK" sz="1800" dirty="0"/>
+          </a:p>
+          <a:p>
+            <a:pPr marL="0" indent="0">
+              <a:buNone/>
+            </a:pPr>
+            <a:r>
+              <a:rPr lang="da-DK" sz="1800" dirty="0"/>
+              <a:t>TPMS: </a:t>
+            </a:r>
+            <a:r>
+              <a:rPr lang="da-DK" sz="1800" dirty="0">
+                <a:hlinkClick r:id="rId3"/>
+              </a:rPr>
+              <a:t>http://www.rematiptop.com/tpms/img/TPMS-warning-light.jpg</a:t>
+            </a:r>
+            <a:endParaRPr lang="da-DK" sz="1800" dirty="0"/>
+          </a:p>
+          <a:p>
+            <a:pPr marL="0" indent="0">
+              <a:buNone/>
+            </a:pPr>
+            <a:r>
+              <a:rPr lang="da-DK" sz="1800" dirty="0"/>
+              <a:t>Computer keyboard: </a:t>
+            </a:r>
+            <a:r>
+              <a:rPr lang="da-DK" sz="1800" dirty="0">
+                <a:hlinkClick r:id="rId4"/>
+              </a:rPr>
+              <a:t>http://stockmedia.cc/computing_technology/slides/DSD_8790.jpg</a:t>
+            </a:r>
+            <a:endParaRPr lang="da-DK" sz="1800" dirty="0"/>
+          </a:p>
+          <a:p>
+            <a:pPr marL="0" indent="0">
+              <a:buNone/>
+            </a:pPr>
+            <a:r>
+              <a:rPr lang="da-DK" sz="1800" dirty="0"/>
+              <a:t>Bonus: </a:t>
+            </a:r>
+            <a:r>
+              <a:rPr lang="da-DK" sz="1800" dirty="0">
+                <a:hlinkClick r:id="rId5"/>
+              </a:rPr>
+              <a:t>http://wjreviews.com/reviews-cta/bonus.png</a:t>
+            </a:r>
+            <a:endParaRPr lang="da-DK" sz="1800" dirty="0"/>
+          </a:p>
+          <a:p>
+            <a:pPr marL="0" indent="0">
+              <a:buNone/>
+            </a:pPr>
+            <a:endParaRPr lang="da-DK" dirty="0"/>
+          </a:p>
+        </p:txBody>
+      </p:sp>
+    </p:spTree>
+    <p:extLst>
+      <p:ext uri="{BB962C8B-B14F-4D97-AF65-F5344CB8AC3E}">
+        <p14:creationId xmlns:p14="http://schemas.microsoft.com/office/powerpoint/2010/main" val="3336927857"/>
+      </p:ext>
+    </p:extLst>
+  </p:cSld>
+  <p:clrMapOvr>
+    <a:masterClrMapping/>
+  </p:clrMapOvr>
+</p:sld>
+</file>
+
+<file path=ppt/slides/slide41.xml><?xml version="1.0" encoding="utf-8"?>
+<p:sld xmlns:a="http://schemas.openxmlformats.org/drawingml/2006/main" xmlns:r="http://schemas.openxmlformats.org/officeDocument/2006/relationships" xmlns:p="http://schemas.openxmlformats.org/presentationml/2006/main">
+  <p:cSld>
+    <p:spTree>
+      <p:nvGrpSpPr>
+        <p:cNvPr id="1" name=""/>
+        <p:cNvGrpSpPr/>
+        <p:nvPr/>
+      </p:nvGrpSpPr>
+      <p:grpSpPr>
+        <a:xfrm>
+          <a:off x="0" y="0"/>
+          <a:ext cx="0" cy="0"/>
+          <a:chOff x="0" y="0"/>
+          <a:chExt cx="0" cy="0"/>
+        </a:xfrm>
+      </p:grpSpPr>
+      <p:sp>
+        <p:nvSpPr>
+          <p:cNvPr id="4" name="Title 3"/>
+          <p:cNvSpPr>
+            <a:spLocks noGrp="1"/>
+          </p:cNvSpPr>
+          <p:nvPr>
+            <p:ph type="title"/>
+          </p:nvPr>
+        </p:nvSpPr>
+        <p:spPr/>
+        <p:txBody>
+          <a:bodyPr/>
+          <a:lstStyle/>
+          <a:p>
+            <a:endParaRPr lang="da-DK"/>
+          </a:p>
+        </p:txBody>
+      </p:sp>
+    </p:spTree>
+    <p:extLst>
+      <p:ext uri="{BB962C8B-B14F-4D97-AF65-F5344CB8AC3E}">
+        <p14:creationId xmlns:p14="http://schemas.microsoft.com/office/powerpoint/2010/main" val="3808375499"/>
+      </p:ext>
+    </p:extLst>
+  </p:cSld>
+  <p:clrMapOvr>
+    <a:masterClrMapping/>
+  </p:clrMapOvr>
 </p:sld>
 </file>
 
@@ -17956,6 +21248,13 @@
   <p:clrMapOvr>
     <a:masterClrMapping/>
   </p:clrMapOvr>
+  <p:timing>
+    <p:tnLst>
+      <p:par>
+        <p:cTn id="1" dur="indefinite" restart="never" nodeType="tmRoot"/>
+      </p:par>
+    </p:tnLst>
+  </p:timing>
 </p:sld>
 </file>
 
@@ -18181,6 +21480,13 @@
   <p:clrMapOvr>
     <a:masterClrMapping/>
   </p:clrMapOvr>
+  <p:timing>
+    <p:tnLst>
+      <p:par>
+        <p:cTn id="1" dur="indefinite" restart="never" nodeType="tmRoot"/>
+      </p:par>
+    </p:tnLst>
+  </p:timing>
 </p:sld>
 </file>
 
@@ -18423,6 +21729,13 @@
   <p:clrMapOvr>
     <a:masterClrMapping/>
   </p:clrMapOvr>
+  <p:timing>
+    <p:tnLst>
+      <p:par>
+        <p:cTn id="1" dur="indefinite" restart="never" nodeType="tmRoot"/>
+      </p:par>
+    </p:tnLst>
+  </p:timing>
 </p:sld>
 </file>
 
@@ -18665,6 +21978,13 @@
   <p:clrMapOvr>
     <a:masterClrMapping/>
   </p:clrMapOvr>
+  <p:timing>
+    <p:tnLst>
+      <p:par>
+        <p:cTn id="1" dur="indefinite" restart="never" nodeType="tmRoot"/>
+      </p:par>
+    </p:tnLst>
+  </p:timing>
 </p:sld>
 </file>
 
@@ -18840,6 +22160,13 @@
   <p:clrMapOvr>
     <a:masterClrMapping/>
   </p:clrMapOvr>
+  <p:timing>
+    <p:tnLst>
+      <p:par>
+        <p:cTn id="1" dur="indefinite" restart="never" nodeType="tmRoot"/>
+      </p:par>
+    </p:tnLst>
+  </p:timing>
 </p:sld>
 </file>
 

</xml_diff>